<commit_message>
Added 3d scanner slides for market analysis
</commit_message>
<xml_diff>
--- a/docs/products/market_analysis.pptx
+++ b/docs/products/market_analysis.pptx
@@ -1,11 +1,13 @@
 
 <file path=ppt/presentation.xml><?xml version="1.0" encoding="utf-8"?>
-<p:presentation xmlns:a="http://schemas.openxmlformats.org/drawingml/2006/main" xmlns:r="http://schemas.openxmlformats.org/officeDocument/2006/relationships" xmlns:p="http://schemas.openxmlformats.org/presentationml/2006/main" saveSubsetFonts="1">
+<p:presentation xmlns:a="http://schemas.openxmlformats.org/drawingml/2006/main" xmlns:r="http://schemas.openxmlformats.org/officeDocument/2006/relationships" xmlns:p="http://schemas.openxmlformats.org/presentationml/2006/main">
   <p:sldMasterIdLst>
     <p:sldMasterId id="2147483648" r:id="rId1"/>
   </p:sldMasterIdLst>
   <p:sldIdLst>
-    <p:sldId id="256" r:id="rId2"/>
+    <p:sldId id="256" r:id="rId3"/>
+    <p:sldId id="257" r:id="rId4"/>
+    <p:sldId id="258" r:id="rId5"/>
   </p:sldIdLst>
   <p:sldSz cx="9144000" cy="6858000" type="screen4x3"/>
   <p:notesSz cx="6858000" cy="9144000"/>
@@ -288,7 +290,6 @@
           <a:p>
             <a:fld id="{8D52E752-28E5-4368-B467-FD45E17F2D0E}" type="datetimeFigureOut">
               <a:rPr lang="en-US" smtClean="0"/>
-              <a:t>7/10/2017</a:t>
             </a:fld>
             <a:endParaRPr lang="en-US"/>
           </a:p>
@@ -330,18 +331,12 @@
           <a:p>
             <a:fld id="{24EAE0EF-B234-4381-877B-176780D00FD9}" type="slidenum">
               <a:rPr lang="en-US" smtClean="0"/>
-              <a:t>‹#›</a:t>
             </a:fld>
             <a:endParaRPr lang="en-US"/>
           </a:p>
         </p:txBody>
       </p:sp>
     </p:spTree>
-    <p:extLst>
-      <p:ext uri="{BB962C8B-B14F-4D97-AF65-F5344CB8AC3E}">
-        <p14:creationId xmlns:p14="http://schemas.microsoft.com/office/powerpoint/2010/main" val="975066371"/>
-      </p:ext>
-    </p:extLst>
   </p:cSld>
   <p:clrMapOvr>
     <a:masterClrMapping/>
@@ -409,6 +404,7 @@
               <a:rPr lang="en-US" smtClean="0"/>
               <a:t>Click to edit Master text styles</a:t>
             </a:r>
+            <a:endParaRPr lang="en-US" smtClean="0"/>
           </a:p>
           <a:p>
             <a:pPr lvl="1"/>
@@ -416,6 +412,7 @@
               <a:rPr lang="en-US" smtClean="0"/>
               <a:t>Second level</a:t>
             </a:r>
+            <a:endParaRPr lang="en-US" smtClean="0"/>
           </a:p>
           <a:p>
             <a:pPr lvl="2"/>
@@ -423,6 +420,7 @@
               <a:rPr lang="en-US" smtClean="0"/>
               <a:t>Third level</a:t>
             </a:r>
+            <a:endParaRPr lang="en-US" smtClean="0"/>
           </a:p>
           <a:p>
             <a:pPr lvl="3"/>
@@ -430,6 +428,7 @@
               <a:rPr lang="en-US" smtClean="0"/>
               <a:t>Fourth level</a:t>
             </a:r>
+            <a:endParaRPr lang="en-US" smtClean="0"/>
           </a:p>
           <a:p>
             <a:pPr lvl="4"/>
@@ -458,7 +457,6 @@
           <a:p>
             <a:fld id="{8D52E752-28E5-4368-B467-FD45E17F2D0E}" type="datetimeFigureOut">
               <a:rPr lang="en-US" smtClean="0"/>
-              <a:t>7/10/2017</a:t>
             </a:fld>
             <a:endParaRPr lang="en-US"/>
           </a:p>
@@ -500,18 +498,12 @@
           <a:p>
             <a:fld id="{24EAE0EF-B234-4381-877B-176780D00FD9}" type="slidenum">
               <a:rPr lang="en-US" smtClean="0"/>
-              <a:t>‹#›</a:t>
             </a:fld>
             <a:endParaRPr lang="en-US"/>
           </a:p>
         </p:txBody>
       </p:sp>
     </p:spTree>
-    <p:extLst>
-      <p:ext uri="{BB962C8B-B14F-4D97-AF65-F5344CB8AC3E}">
-        <p14:creationId xmlns:p14="http://schemas.microsoft.com/office/powerpoint/2010/main" val="2084264912"/>
-      </p:ext>
-    </p:extLst>
   </p:cSld>
   <p:clrMapOvr>
     <a:masterClrMapping/>
@@ -589,6 +581,7 @@
               <a:rPr lang="en-US" smtClean="0"/>
               <a:t>Click to edit Master text styles</a:t>
             </a:r>
+            <a:endParaRPr lang="en-US" smtClean="0"/>
           </a:p>
           <a:p>
             <a:pPr lvl="1"/>
@@ -596,6 +589,7 @@
               <a:rPr lang="en-US" smtClean="0"/>
               <a:t>Second level</a:t>
             </a:r>
+            <a:endParaRPr lang="en-US" smtClean="0"/>
           </a:p>
           <a:p>
             <a:pPr lvl="2"/>
@@ -603,6 +597,7 @@
               <a:rPr lang="en-US" smtClean="0"/>
               <a:t>Third level</a:t>
             </a:r>
+            <a:endParaRPr lang="en-US" smtClean="0"/>
           </a:p>
           <a:p>
             <a:pPr lvl="3"/>
@@ -610,6 +605,7 @@
               <a:rPr lang="en-US" smtClean="0"/>
               <a:t>Fourth level</a:t>
             </a:r>
+            <a:endParaRPr lang="en-US" smtClean="0"/>
           </a:p>
           <a:p>
             <a:pPr lvl="4"/>
@@ -638,7 +634,6 @@
           <a:p>
             <a:fld id="{8D52E752-28E5-4368-B467-FD45E17F2D0E}" type="datetimeFigureOut">
               <a:rPr lang="en-US" smtClean="0"/>
-              <a:t>7/10/2017</a:t>
             </a:fld>
             <a:endParaRPr lang="en-US"/>
           </a:p>
@@ -680,18 +675,12 @@
           <a:p>
             <a:fld id="{24EAE0EF-B234-4381-877B-176780D00FD9}" type="slidenum">
               <a:rPr lang="en-US" smtClean="0"/>
-              <a:t>‹#›</a:t>
             </a:fld>
             <a:endParaRPr lang="en-US"/>
           </a:p>
         </p:txBody>
       </p:sp>
     </p:spTree>
-    <p:extLst>
-      <p:ext uri="{BB962C8B-B14F-4D97-AF65-F5344CB8AC3E}">
-        <p14:creationId xmlns:p14="http://schemas.microsoft.com/office/powerpoint/2010/main" val="65906238"/>
-      </p:ext>
-    </p:extLst>
   </p:cSld>
   <p:clrMapOvr>
     <a:masterClrMapping/>
@@ -759,6 +748,7 @@
               <a:rPr lang="en-US" smtClean="0"/>
               <a:t>Click to edit Master text styles</a:t>
             </a:r>
+            <a:endParaRPr lang="en-US" smtClean="0"/>
           </a:p>
           <a:p>
             <a:pPr lvl="1"/>
@@ -766,6 +756,7 @@
               <a:rPr lang="en-US" smtClean="0"/>
               <a:t>Second level</a:t>
             </a:r>
+            <a:endParaRPr lang="en-US" smtClean="0"/>
           </a:p>
           <a:p>
             <a:pPr lvl="2"/>
@@ -773,6 +764,7 @@
               <a:rPr lang="en-US" smtClean="0"/>
               <a:t>Third level</a:t>
             </a:r>
+            <a:endParaRPr lang="en-US" smtClean="0"/>
           </a:p>
           <a:p>
             <a:pPr lvl="3"/>
@@ -780,6 +772,7 @@
               <a:rPr lang="en-US" smtClean="0"/>
               <a:t>Fourth level</a:t>
             </a:r>
+            <a:endParaRPr lang="en-US" smtClean="0"/>
           </a:p>
           <a:p>
             <a:pPr lvl="4"/>
@@ -808,7 +801,6 @@
           <a:p>
             <a:fld id="{8D52E752-28E5-4368-B467-FD45E17F2D0E}" type="datetimeFigureOut">
               <a:rPr lang="en-US" smtClean="0"/>
-              <a:t>7/10/2017</a:t>
             </a:fld>
             <a:endParaRPr lang="en-US"/>
           </a:p>
@@ -850,18 +842,12 @@
           <a:p>
             <a:fld id="{24EAE0EF-B234-4381-877B-176780D00FD9}" type="slidenum">
               <a:rPr lang="en-US" smtClean="0"/>
-              <a:t>‹#›</a:t>
             </a:fld>
             <a:endParaRPr lang="en-US"/>
           </a:p>
         </p:txBody>
       </p:sp>
     </p:spTree>
-    <p:extLst>
-      <p:ext uri="{BB962C8B-B14F-4D97-AF65-F5344CB8AC3E}">
-        <p14:creationId xmlns:p14="http://schemas.microsoft.com/office/powerpoint/2010/main" val="2149420515"/>
-      </p:ext>
-    </p:extLst>
   </p:cSld>
   <p:clrMapOvr>
     <a:masterClrMapping/>
@@ -1034,6 +1020,7 @@
               <a:rPr lang="en-US" smtClean="0"/>
               <a:t>Click to edit Master text styles</a:t>
             </a:r>
+            <a:endParaRPr lang="en-US" smtClean="0"/>
           </a:p>
         </p:txBody>
       </p:sp>
@@ -1054,7 +1041,6 @@
           <a:p>
             <a:fld id="{8D52E752-28E5-4368-B467-FD45E17F2D0E}" type="datetimeFigureOut">
               <a:rPr lang="en-US" smtClean="0"/>
-              <a:t>7/10/2017</a:t>
             </a:fld>
             <a:endParaRPr lang="en-US"/>
           </a:p>
@@ -1096,18 +1082,12 @@
           <a:p>
             <a:fld id="{24EAE0EF-B234-4381-877B-176780D00FD9}" type="slidenum">
               <a:rPr lang="en-US" smtClean="0"/>
-              <a:t>‹#›</a:t>
             </a:fld>
             <a:endParaRPr lang="en-US"/>
           </a:p>
         </p:txBody>
       </p:sp>
     </p:spTree>
-    <p:extLst>
-      <p:ext uri="{BB962C8B-B14F-4D97-AF65-F5344CB8AC3E}">
-        <p14:creationId xmlns:p14="http://schemas.microsoft.com/office/powerpoint/2010/main" val="401102955"/>
-      </p:ext>
-    </p:extLst>
   </p:cSld>
   <p:clrMapOvr>
     <a:masterClrMapping/>
@@ -1208,6 +1188,7 @@
               <a:rPr lang="en-US" smtClean="0"/>
               <a:t>Click to edit Master text styles</a:t>
             </a:r>
+            <a:endParaRPr lang="en-US" smtClean="0"/>
           </a:p>
           <a:p>
             <a:pPr lvl="1"/>
@@ -1215,6 +1196,7 @@
               <a:rPr lang="en-US" smtClean="0"/>
               <a:t>Second level</a:t>
             </a:r>
+            <a:endParaRPr lang="en-US" smtClean="0"/>
           </a:p>
           <a:p>
             <a:pPr lvl="2"/>
@@ -1222,6 +1204,7 @@
               <a:rPr lang="en-US" smtClean="0"/>
               <a:t>Third level</a:t>
             </a:r>
+            <a:endParaRPr lang="en-US" smtClean="0"/>
           </a:p>
           <a:p>
             <a:pPr lvl="3"/>
@@ -1229,6 +1212,7 @@
               <a:rPr lang="en-US" smtClean="0"/>
               <a:t>Fourth level</a:t>
             </a:r>
+            <a:endParaRPr lang="en-US" smtClean="0"/>
           </a:p>
           <a:p>
             <a:pPr lvl="4"/>
@@ -1293,6 +1277,7 @@
               <a:rPr lang="en-US" smtClean="0"/>
               <a:t>Click to edit Master text styles</a:t>
             </a:r>
+            <a:endParaRPr lang="en-US" smtClean="0"/>
           </a:p>
           <a:p>
             <a:pPr lvl="1"/>
@@ -1300,6 +1285,7 @@
               <a:rPr lang="en-US" smtClean="0"/>
               <a:t>Second level</a:t>
             </a:r>
+            <a:endParaRPr lang="en-US" smtClean="0"/>
           </a:p>
           <a:p>
             <a:pPr lvl="2"/>
@@ -1307,6 +1293,7 @@
               <a:rPr lang="en-US" smtClean="0"/>
               <a:t>Third level</a:t>
             </a:r>
+            <a:endParaRPr lang="en-US" smtClean="0"/>
           </a:p>
           <a:p>
             <a:pPr lvl="3"/>
@@ -1314,6 +1301,7 @@
               <a:rPr lang="en-US" smtClean="0"/>
               <a:t>Fourth level</a:t>
             </a:r>
+            <a:endParaRPr lang="en-US" smtClean="0"/>
           </a:p>
           <a:p>
             <a:pPr lvl="4"/>
@@ -1342,7 +1330,6 @@
           <a:p>
             <a:fld id="{8D52E752-28E5-4368-B467-FD45E17F2D0E}" type="datetimeFigureOut">
               <a:rPr lang="en-US" smtClean="0"/>
-              <a:t>7/10/2017</a:t>
             </a:fld>
             <a:endParaRPr lang="en-US"/>
           </a:p>
@@ -1384,18 +1371,12 @@
           <a:p>
             <a:fld id="{24EAE0EF-B234-4381-877B-176780D00FD9}" type="slidenum">
               <a:rPr lang="en-US" smtClean="0"/>
-              <a:t>‹#›</a:t>
             </a:fld>
             <a:endParaRPr lang="en-US"/>
           </a:p>
         </p:txBody>
       </p:sp>
     </p:spTree>
-    <p:extLst>
-      <p:ext uri="{BB962C8B-B14F-4D97-AF65-F5344CB8AC3E}">
-        <p14:creationId xmlns:p14="http://schemas.microsoft.com/office/powerpoint/2010/main" val="2326310586"/>
-      </p:ext>
-    </p:extLst>
   </p:cSld>
   <p:clrMapOvr>
     <a:masterClrMapping/>
@@ -1509,6 +1490,7 @@
               <a:rPr lang="en-US" smtClean="0"/>
               <a:t>Click to edit Master text styles</a:t>
             </a:r>
+            <a:endParaRPr lang="en-US" smtClean="0"/>
           </a:p>
         </p:txBody>
       </p:sp>
@@ -1565,6 +1547,7 @@
               <a:rPr lang="en-US" smtClean="0"/>
               <a:t>Click to edit Master text styles</a:t>
             </a:r>
+            <a:endParaRPr lang="en-US" smtClean="0"/>
           </a:p>
           <a:p>
             <a:pPr lvl="1"/>
@@ -1572,6 +1555,7 @@
               <a:rPr lang="en-US" smtClean="0"/>
               <a:t>Second level</a:t>
             </a:r>
+            <a:endParaRPr lang="en-US" smtClean="0"/>
           </a:p>
           <a:p>
             <a:pPr lvl="2"/>
@@ -1579,6 +1563,7 @@
               <a:rPr lang="en-US" smtClean="0"/>
               <a:t>Third level</a:t>
             </a:r>
+            <a:endParaRPr lang="en-US" smtClean="0"/>
           </a:p>
           <a:p>
             <a:pPr lvl="3"/>
@@ -1586,6 +1571,7 @@
               <a:rPr lang="en-US" smtClean="0"/>
               <a:t>Fourth level</a:t>
             </a:r>
+            <a:endParaRPr lang="en-US" smtClean="0"/>
           </a:p>
           <a:p>
             <a:pPr lvl="4"/>
@@ -1659,6 +1645,7 @@
               <a:rPr lang="en-US" smtClean="0"/>
               <a:t>Click to edit Master text styles</a:t>
             </a:r>
+            <a:endParaRPr lang="en-US" smtClean="0"/>
           </a:p>
         </p:txBody>
       </p:sp>
@@ -1715,6 +1702,7 @@
               <a:rPr lang="en-US" smtClean="0"/>
               <a:t>Click to edit Master text styles</a:t>
             </a:r>
+            <a:endParaRPr lang="en-US" smtClean="0"/>
           </a:p>
           <a:p>
             <a:pPr lvl="1"/>
@@ -1722,6 +1710,7 @@
               <a:rPr lang="en-US" smtClean="0"/>
               <a:t>Second level</a:t>
             </a:r>
+            <a:endParaRPr lang="en-US" smtClean="0"/>
           </a:p>
           <a:p>
             <a:pPr lvl="2"/>
@@ -1729,6 +1718,7 @@
               <a:rPr lang="en-US" smtClean="0"/>
               <a:t>Third level</a:t>
             </a:r>
+            <a:endParaRPr lang="en-US" smtClean="0"/>
           </a:p>
           <a:p>
             <a:pPr lvl="3"/>
@@ -1736,6 +1726,7 @@
               <a:rPr lang="en-US" smtClean="0"/>
               <a:t>Fourth level</a:t>
             </a:r>
+            <a:endParaRPr lang="en-US" smtClean="0"/>
           </a:p>
           <a:p>
             <a:pPr lvl="4"/>
@@ -1764,7 +1755,6 @@
           <a:p>
             <a:fld id="{8D52E752-28E5-4368-B467-FD45E17F2D0E}" type="datetimeFigureOut">
               <a:rPr lang="en-US" smtClean="0"/>
-              <a:t>7/10/2017</a:t>
             </a:fld>
             <a:endParaRPr lang="en-US"/>
           </a:p>
@@ -1806,18 +1796,12 @@
           <a:p>
             <a:fld id="{24EAE0EF-B234-4381-877B-176780D00FD9}" type="slidenum">
               <a:rPr lang="en-US" smtClean="0"/>
-              <a:t>‹#›</a:t>
             </a:fld>
             <a:endParaRPr lang="en-US"/>
           </a:p>
         </p:txBody>
       </p:sp>
     </p:spTree>
-    <p:extLst>
-      <p:ext uri="{BB962C8B-B14F-4D97-AF65-F5344CB8AC3E}">
-        <p14:creationId xmlns:p14="http://schemas.microsoft.com/office/powerpoint/2010/main" val="1536225770"/>
-      </p:ext>
-    </p:extLst>
   </p:cSld>
   <p:clrMapOvr>
     <a:masterClrMapping/>
@@ -1882,7 +1866,6 @@
           <a:p>
             <a:fld id="{8D52E752-28E5-4368-B467-FD45E17F2D0E}" type="datetimeFigureOut">
               <a:rPr lang="en-US" smtClean="0"/>
-              <a:t>7/10/2017</a:t>
             </a:fld>
             <a:endParaRPr lang="en-US"/>
           </a:p>
@@ -1924,18 +1907,12 @@
           <a:p>
             <a:fld id="{24EAE0EF-B234-4381-877B-176780D00FD9}" type="slidenum">
               <a:rPr lang="en-US" smtClean="0"/>
-              <a:t>‹#›</a:t>
             </a:fld>
             <a:endParaRPr lang="en-US"/>
           </a:p>
         </p:txBody>
       </p:sp>
     </p:spTree>
-    <p:extLst>
-      <p:ext uri="{BB962C8B-B14F-4D97-AF65-F5344CB8AC3E}">
-        <p14:creationId xmlns:p14="http://schemas.microsoft.com/office/powerpoint/2010/main" val="123249320"/>
-      </p:ext>
-    </p:extLst>
   </p:cSld>
   <p:clrMapOvr>
     <a:masterClrMapping/>
@@ -1977,7 +1954,6 @@
           <a:p>
             <a:fld id="{8D52E752-28E5-4368-B467-FD45E17F2D0E}" type="datetimeFigureOut">
               <a:rPr lang="en-US" smtClean="0"/>
-              <a:t>7/10/2017</a:t>
             </a:fld>
             <a:endParaRPr lang="en-US"/>
           </a:p>
@@ -2019,18 +1995,12 @@
           <a:p>
             <a:fld id="{24EAE0EF-B234-4381-877B-176780D00FD9}" type="slidenum">
               <a:rPr lang="en-US" smtClean="0"/>
-              <a:t>‹#›</a:t>
             </a:fld>
             <a:endParaRPr lang="en-US"/>
           </a:p>
         </p:txBody>
       </p:sp>
     </p:spTree>
-    <p:extLst>
-      <p:ext uri="{BB962C8B-B14F-4D97-AF65-F5344CB8AC3E}">
-        <p14:creationId xmlns:p14="http://schemas.microsoft.com/office/powerpoint/2010/main" val="1303517283"/>
-      </p:ext>
-    </p:extLst>
   </p:cSld>
   <p:clrMapOvr>
     <a:masterClrMapping/>
@@ -2140,6 +2110,7 @@
               <a:rPr lang="en-US" smtClean="0"/>
               <a:t>Click to edit Master text styles</a:t>
             </a:r>
+            <a:endParaRPr lang="en-US" smtClean="0"/>
           </a:p>
           <a:p>
             <a:pPr lvl="1"/>
@@ -2147,6 +2118,7 @@
               <a:rPr lang="en-US" smtClean="0"/>
               <a:t>Second level</a:t>
             </a:r>
+            <a:endParaRPr lang="en-US" smtClean="0"/>
           </a:p>
           <a:p>
             <a:pPr lvl="2"/>
@@ -2154,6 +2126,7 @@
               <a:rPr lang="en-US" smtClean="0"/>
               <a:t>Third level</a:t>
             </a:r>
+            <a:endParaRPr lang="en-US" smtClean="0"/>
           </a:p>
           <a:p>
             <a:pPr lvl="3"/>
@@ -2161,6 +2134,7 @@
               <a:rPr lang="en-US" smtClean="0"/>
               <a:t>Fourth level</a:t>
             </a:r>
+            <a:endParaRPr lang="en-US" smtClean="0"/>
           </a:p>
           <a:p>
             <a:pPr lvl="4"/>
@@ -2234,6 +2208,7 @@
               <a:rPr lang="en-US" smtClean="0"/>
               <a:t>Click to edit Master text styles</a:t>
             </a:r>
+            <a:endParaRPr lang="en-US" smtClean="0"/>
           </a:p>
         </p:txBody>
       </p:sp>
@@ -2254,7 +2229,6 @@
           <a:p>
             <a:fld id="{8D52E752-28E5-4368-B467-FD45E17F2D0E}" type="datetimeFigureOut">
               <a:rPr lang="en-US" smtClean="0"/>
-              <a:t>7/10/2017</a:t>
             </a:fld>
             <a:endParaRPr lang="en-US"/>
           </a:p>
@@ -2296,18 +2270,12 @@
           <a:p>
             <a:fld id="{24EAE0EF-B234-4381-877B-176780D00FD9}" type="slidenum">
               <a:rPr lang="en-US" smtClean="0"/>
-              <a:t>‹#›</a:t>
             </a:fld>
             <a:endParaRPr lang="en-US"/>
           </a:p>
         </p:txBody>
       </p:sp>
     </p:spTree>
-    <p:extLst>
-      <p:ext uri="{BB962C8B-B14F-4D97-AF65-F5344CB8AC3E}">
-        <p14:creationId xmlns:p14="http://schemas.microsoft.com/office/powerpoint/2010/main" val="1109352508"/>
-      </p:ext>
-    </p:extLst>
   </p:cSld>
   <p:clrMapOvr>
     <a:masterClrMapping/>
@@ -2487,6 +2455,7 @@
               <a:rPr lang="en-US" smtClean="0"/>
               <a:t>Click to edit Master text styles</a:t>
             </a:r>
+            <a:endParaRPr lang="en-US" smtClean="0"/>
           </a:p>
         </p:txBody>
       </p:sp>
@@ -2507,7 +2476,6 @@
           <a:p>
             <a:fld id="{8D52E752-28E5-4368-B467-FD45E17F2D0E}" type="datetimeFigureOut">
               <a:rPr lang="en-US" smtClean="0"/>
-              <a:t>7/10/2017</a:t>
             </a:fld>
             <a:endParaRPr lang="en-US"/>
           </a:p>
@@ -2549,18 +2517,12 @@
           <a:p>
             <a:fld id="{24EAE0EF-B234-4381-877B-176780D00FD9}" type="slidenum">
               <a:rPr lang="en-US" smtClean="0"/>
-              <a:t>‹#›</a:t>
             </a:fld>
             <a:endParaRPr lang="en-US"/>
           </a:p>
         </p:txBody>
       </p:sp>
     </p:spTree>
-    <p:extLst>
-      <p:ext uri="{BB962C8B-B14F-4D97-AF65-F5344CB8AC3E}">
-        <p14:creationId xmlns:p14="http://schemas.microsoft.com/office/powerpoint/2010/main" val="177238242"/>
-      </p:ext>
-    </p:extLst>
   </p:cSld>
   <p:clrMapOvr>
     <a:masterClrMapping/>
@@ -2659,6 +2621,7 @@
               <a:rPr lang="en-US" smtClean="0"/>
               <a:t>Click to edit Master text styles</a:t>
             </a:r>
+            <a:endParaRPr lang="en-US" smtClean="0"/>
           </a:p>
           <a:p>
             <a:pPr lvl="1"/>
@@ -2666,6 +2629,7 @@
               <a:rPr lang="en-US" smtClean="0"/>
               <a:t>Second level</a:t>
             </a:r>
+            <a:endParaRPr lang="en-US" smtClean="0"/>
           </a:p>
           <a:p>
             <a:pPr lvl="2"/>
@@ -2673,6 +2637,7 @@
               <a:rPr lang="en-US" smtClean="0"/>
               <a:t>Third level</a:t>
             </a:r>
+            <a:endParaRPr lang="en-US" smtClean="0"/>
           </a:p>
           <a:p>
             <a:pPr lvl="3"/>
@@ -2680,6 +2645,7 @@
               <a:rPr lang="en-US" smtClean="0"/>
               <a:t>Fourth level</a:t>
             </a:r>
+            <a:endParaRPr lang="en-US" smtClean="0"/>
           </a:p>
           <a:p>
             <a:pPr lvl="4"/>
@@ -2726,7 +2692,6 @@
           <a:p>
             <a:fld id="{8D52E752-28E5-4368-B467-FD45E17F2D0E}" type="datetimeFigureOut">
               <a:rPr lang="en-US" smtClean="0"/>
-              <a:t>7/10/2017</a:t>
             </a:fld>
             <a:endParaRPr lang="en-US"/>
           </a:p>
@@ -2804,18 +2769,12 @@
           <a:p>
             <a:fld id="{24EAE0EF-B234-4381-877B-176780D00FD9}" type="slidenum">
               <a:rPr lang="en-US" smtClean="0"/>
-              <a:t>‹#›</a:t>
             </a:fld>
             <a:endParaRPr lang="en-US"/>
           </a:p>
         </p:txBody>
       </p:sp>
     </p:spTree>
-    <p:extLst>
-      <p:ext uri="{BB962C8B-B14F-4D97-AF65-F5344CB8AC3E}">
-        <p14:creationId xmlns:p14="http://schemas.microsoft.com/office/powerpoint/2010/main" val="784017325"/>
-      </p:ext>
-    </p:extLst>
   </p:cSld>
   <p:clrMap bg1="lt1" tx1="dk1" bg2="lt2" tx2="dk2" accent1="accent1" accent2="accent2" accent3="accent3" accent4="accent4" accent5="accent5" accent6="accent6" hlink="hlink" folHlink="folHlink"/>
   <p:sldLayoutIdLst>
@@ -3130,7 +3089,7 @@
               <a:avLst/>
             </a:prstGeom>
             <a:blipFill dpi="0" rotWithShape="1">
-              <a:blip r:embed="rId2">
+              <a:blip r:embed="rId1">
                 <a:alphaModFix amt="65000"/>
                 <a:duotone>
                   <a:schemeClr val="accent1">
@@ -3189,7 +3148,7 @@
               <a:avLst/>
             </a:prstGeom>
             <a:blipFill dpi="0" rotWithShape="1">
-              <a:blip r:embed="rId3">
+              <a:blip r:embed="rId2">
                 <a:alphaModFix amt="65000"/>
                 <a:duotone>
                   <a:schemeClr val="accent1">
@@ -3248,7 +3207,7 @@
               <a:avLst/>
             </a:prstGeom>
             <a:blipFill dpi="0" rotWithShape="1">
-              <a:blip r:embed="rId4">
+              <a:blip r:embed="rId3">
                 <a:alphaModFix amt="65000"/>
                 <a:duotone>
                   <a:schemeClr val="accent2">
@@ -3307,7 +3266,7 @@
               <a:avLst/>
             </a:prstGeom>
             <a:blipFill dpi="0" rotWithShape="1">
-              <a:blip r:embed="rId5">
+              <a:blip r:embed="rId4">
                 <a:alphaModFix amt="65000"/>
                 <a:duotone>
                   <a:schemeClr val="accent1">
@@ -3366,7 +3325,6 @@
           <a:prstGeom prst="rect">
             <a:avLst/>
           </a:prstGeom>
-          <a:ln/>
         </p:spPr>
         <p:style>
           <a:lnRef idx="1">
@@ -3412,7 +3370,6 @@
           <a:prstGeom prst="rect">
             <a:avLst/>
           </a:prstGeom>
-          <a:ln/>
         </p:spPr>
         <p:style>
           <a:lnRef idx="0">
@@ -3473,7 +3430,6 @@
           <a:prstGeom prst="rect">
             <a:avLst/>
           </a:prstGeom>
-          <a:ln/>
         </p:spPr>
         <p:style>
           <a:lnRef idx="0">
@@ -3534,7 +3490,6 @@
           <a:prstGeom prst="rect">
             <a:avLst/>
           </a:prstGeom>
-          <a:ln/>
         </p:spPr>
         <p:style>
           <a:lnRef idx="0">
@@ -3595,7 +3550,6 @@
           <a:prstGeom prst="rect">
             <a:avLst/>
           </a:prstGeom>
-          <a:ln/>
         </p:spPr>
         <p:style>
           <a:lnRef idx="0">
@@ -3656,7 +3610,6 @@
           <a:prstGeom prst="rect">
             <a:avLst/>
           </a:prstGeom>
-          <a:ln/>
         </p:spPr>
         <p:style>
           <a:lnRef idx="0">
@@ -3717,7 +3670,6 @@
           <a:prstGeom prst="rect">
             <a:avLst/>
           </a:prstGeom>
-          <a:ln/>
         </p:spPr>
         <p:style>
           <a:lnRef idx="0">
@@ -3778,7 +3730,6 @@
           <a:prstGeom prst="rect">
             <a:avLst/>
           </a:prstGeom>
-          <a:ln/>
         </p:spPr>
         <p:style>
           <a:lnRef idx="0">
@@ -3839,7 +3790,6 @@
           <a:prstGeom prst="rect">
             <a:avLst/>
           </a:prstGeom>
-          <a:ln/>
         </p:spPr>
         <p:style>
           <a:lnRef idx="0">
@@ -3900,7 +3850,6 @@
           <a:prstGeom prst="rect">
             <a:avLst/>
           </a:prstGeom>
-          <a:ln/>
         </p:spPr>
         <p:style>
           <a:lnRef idx="0">
@@ -3961,7 +3910,6 @@
           <a:prstGeom prst="rect">
             <a:avLst/>
           </a:prstGeom>
-          <a:ln/>
         </p:spPr>
         <p:style>
           <a:lnRef idx="0">
@@ -4428,7 +4376,6 @@
           <a:prstGeom prst="rect">
             <a:avLst/>
           </a:prstGeom>
-          <a:ln/>
         </p:spPr>
         <p:style>
           <a:lnRef idx="0">
@@ -4462,6 +4409,16 @@
               </a:rPr>
               <a:t>3D Printing</a:t>
             </a:r>
+            <a:endParaRPr lang="en-US" sz="1100" b="1" dirty="0">
+              <a:effectLst>
+                <a:outerShdw blurRad="38100" dist="38100" dir="2700000" algn="tl">
+                  <a:srgbClr val="000000">
+                    <a:alpha val="43137"/>
+                  </a:srgbClr>
+                </a:outerShdw>
+              </a:effectLst>
+              <a:latin typeface="Corbel" panose="020B0503020204020204" pitchFamily="34" charset="0"/>
+            </a:endParaRPr>
           </a:p>
         </p:txBody>
       </p:sp>
@@ -4563,7 +4520,7 @@
             <a:avLst/>
           </a:prstGeom>
           <a:blipFill>
-            <a:blip r:embed="rId6"/>
+            <a:blip r:embed="rId5"/>
             <a:stretch>
               <a:fillRect l="-33336" r="-2775"/>
             </a:stretch>
@@ -4598,11 +4555,820 @@
         </p:txBody>
       </p:sp>
     </p:spTree>
-    <p:extLst>
-      <p:ext uri="{BB962C8B-B14F-4D97-AF65-F5344CB8AC3E}">
-        <p14:creationId xmlns:p14="http://schemas.microsoft.com/office/powerpoint/2010/main" val="2356936257"/>
-      </p:ext>
-    </p:extLst>
+  </p:cSld>
+  <p:clrMapOvr>
+    <a:masterClrMapping/>
+  </p:clrMapOvr>
+</p:sld>
+</file>
+
+<file path=ppt/slides/slide2.xml><?xml version="1.0" encoding="utf-8"?>
+<p:sld xmlns:a="http://schemas.openxmlformats.org/drawingml/2006/main" xmlns:r="http://schemas.openxmlformats.org/officeDocument/2006/relationships" xmlns:p="http://schemas.openxmlformats.org/presentationml/2006/main">
+  <p:cSld>
+    <p:spTree>
+      <p:nvGrpSpPr>
+        <p:cNvPr id="1" name=""/>
+        <p:cNvGrpSpPr/>
+        <p:nvPr/>
+      </p:nvGrpSpPr>
+      <p:grpSpPr/>
+      <p:sp>
+        <p:nvSpPr>
+          <p:cNvPr id="59" name="Rectangle 58"/>
+          <p:cNvSpPr/>
+          <p:nvPr/>
+        </p:nvSpPr>
+        <p:spPr>
+          <a:xfrm>
+            <a:off x="0" y="304800"/>
+            <a:ext cx="9144000" cy="457200"/>
+          </a:xfrm>
+          <a:prstGeom prst="rect">
+            <a:avLst/>
+          </a:prstGeom>
+        </p:spPr>
+        <p:style>
+          <a:lnRef idx="1">
+            <a:schemeClr val="accent1"/>
+          </a:lnRef>
+          <a:fillRef idx="3">
+            <a:schemeClr val="accent1"/>
+          </a:fillRef>
+          <a:effectRef idx="2">
+            <a:schemeClr val="accent1"/>
+          </a:effectRef>
+          <a:fontRef idx="minor">
+            <a:schemeClr val="lt1"/>
+          </a:fontRef>
+        </p:style>
+        <p:txBody>
+          <a:bodyPr rtlCol="0" anchor="ctr"/>
+          <a:p>
+            <a:r>
+              <a:rPr lang="en-US" dirty="0">
+                <a:latin typeface="Corbel" panose="020B0503020204020204" pitchFamily="34" charset="0"/>
+              </a:rPr>
+              <a:t>3D SCANNING BECOMES EASY</a:t>
+            </a:r>
+            <a:endParaRPr lang="en-US" dirty="0">
+              <a:latin typeface="Corbel" panose="020B0503020204020204" pitchFamily="34" charset="0"/>
+            </a:endParaRPr>
+          </a:p>
+        </p:txBody>
+      </p:sp>
+      <p:grpSp>
+        <p:nvGrpSpPr>
+          <p:cNvPr id="27" name="Group 26"/>
+          <p:cNvGrpSpPr/>
+          <p:nvPr/>
+        </p:nvGrpSpPr>
+        <p:grpSpPr>
+          <a:xfrm>
+            <a:off x="1277620" y="1078865"/>
+            <a:ext cx="3180715" cy="5036185"/>
+            <a:chOff x="1052" y="1699"/>
+            <a:chExt cx="5009" cy="7931"/>
+          </a:xfrm>
+        </p:grpSpPr>
+        <p:pic>
+          <p:nvPicPr>
+            <p:cNvPr id="5" name="Picture 4" descr="51+Ds3f7nLL._AC_SL1205_"/>
+            <p:cNvPicPr>
+              <a:picLocks noChangeAspect="1"/>
+            </p:cNvPicPr>
+            <p:nvPr/>
+          </p:nvPicPr>
+          <p:blipFill>
+            <a:blip r:embed="rId1"/>
+            <a:stretch>
+              <a:fillRect/>
+            </a:stretch>
+          </p:blipFill>
+          <p:spPr>
+            <a:xfrm>
+              <a:off x="1053" y="1699"/>
+              <a:ext cx="3070" cy="1560"/>
+            </a:xfrm>
+            <a:prstGeom prst="rect">
+              <a:avLst/>
+            </a:prstGeom>
+          </p:spPr>
+        </p:pic>
+        <p:pic>
+          <p:nvPicPr>
+            <p:cNvPr id="6" name="Picture 5" descr="sense2_buynow"/>
+            <p:cNvPicPr>
+              <a:picLocks noChangeAspect="1"/>
+            </p:cNvPicPr>
+            <p:nvPr/>
+          </p:nvPicPr>
+          <p:blipFill>
+            <a:blip r:embed="rId2"/>
+            <a:stretch>
+              <a:fillRect/>
+            </a:stretch>
+          </p:blipFill>
+          <p:spPr>
+            <a:xfrm>
+              <a:off x="1052" y="3379"/>
+              <a:ext cx="3069" cy="2125"/>
+            </a:xfrm>
+            <a:prstGeom prst="rect">
+              <a:avLst/>
+            </a:prstGeom>
+          </p:spPr>
+        </p:pic>
+        <p:pic>
+          <p:nvPicPr>
+            <p:cNvPr id="7" name="Picture 6" descr="isense_features_upgradeipad"/>
+            <p:cNvPicPr>
+              <a:picLocks noChangeAspect="1"/>
+            </p:cNvPicPr>
+            <p:nvPr/>
+          </p:nvPicPr>
+          <p:blipFill>
+            <a:blip r:embed="rId3"/>
+            <a:stretch>
+              <a:fillRect/>
+            </a:stretch>
+          </p:blipFill>
+          <p:spPr>
+            <a:xfrm>
+              <a:off x="1053" y="5624"/>
+              <a:ext cx="3069" cy="1944"/>
+            </a:xfrm>
+            <a:prstGeom prst="rect">
+              <a:avLst/>
+            </a:prstGeom>
+          </p:spPr>
+        </p:pic>
+        <p:pic>
+          <p:nvPicPr>
+            <p:cNvPr id="8" name="Picture 7" descr="Structure-Sensor"/>
+            <p:cNvPicPr>
+              <a:picLocks noChangeAspect="1"/>
+            </p:cNvPicPr>
+            <p:nvPr/>
+          </p:nvPicPr>
+          <p:blipFill>
+            <a:blip r:embed="rId4"/>
+            <a:stretch>
+              <a:fillRect/>
+            </a:stretch>
+          </p:blipFill>
+          <p:spPr>
+            <a:xfrm>
+              <a:off x="1053" y="7688"/>
+              <a:ext cx="3068" cy="1943"/>
+            </a:xfrm>
+            <a:prstGeom prst="rect">
+              <a:avLst/>
+            </a:prstGeom>
+          </p:spPr>
+        </p:pic>
+        <p:sp>
+          <p:nvSpPr>
+            <p:cNvPr id="14" name="Text Box 13"/>
+            <p:cNvSpPr txBox="1"/>
+            <p:nvPr/>
+          </p:nvSpPr>
+          <p:spPr>
+            <a:xfrm>
+              <a:off x="4119" y="2285"/>
+              <a:ext cx="1392" cy="435"/>
+            </a:xfrm>
+            <a:prstGeom prst="rect">
+              <a:avLst/>
+            </a:prstGeom>
+            <a:noFill/>
+          </p:spPr>
+          <p:txBody>
+            <a:bodyPr wrap="none" rtlCol="0">
+              <a:spAutoFit/>
+            </a:bodyPr>
+            <a:p>
+              <a:r>
+                <a:rPr lang="en-US" sz="1200">
+                  <a:solidFill>
+                    <a:schemeClr val="bg1"/>
+                  </a:solidFill>
+                  <a:latin typeface="Corbel" panose="020B0503020204020204" pitchFamily="34" charset="0"/>
+                </a:rPr>
+                <a:t>XBOX ONE</a:t>
+              </a:r>
+              <a:endParaRPr lang="en-US" sz="1200">
+                <a:solidFill>
+                  <a:schemeClr val="bg1"/>
+                </a:solidFill>
+                <a:latin typeface="Corbel" panose="020B0503020204020204" pitchFamily="34" charset="0"/>
+              </a:endParaRPr>
+            </a:p>
+          </p:txBody>
+        </p:sp>
+        <p:sp>
+          <p:nvSpPr>
+            <p:cNvPr id="15" name="Text Box 14"/>
+            <p:cNvSpPr txBox="1"/>
+            <p:nvPr/>
+          </p:nvSpPr>
+          <p:spPr>
+            <a:xfrm>
+              <a:off x="4119" y="4111"/>
+              <a:ext cx="882" cy="435"/>
+            </a:xfrm>
+            <a:prstGeom prst="rect">
+              <a:avLst/>
+            </a:prstGeom>
+            <a:noFill/>
+          </p:spPr>
+          <p:txBody>
+            <a:bodyPr wrap="none" rtlCol="0">
+              <a:spAutoFit/>
+            </a:bodyPr>
+            <a:p>
+              <a:r>
+                <a:rPr lang="en-US" sz="1200">
+                  <a:solidFill>
+                    <a:schemeClr val="bg1"/>
+                  </a:solidFill>
+                  <a:latin typeface="Corbel" panose="020B0503020204020204" pitchFamily="34" charset="0"/>
+                </a:rPr>
+                <a:t>Sense</a:t>
+              </a:r>
+              <a:endParaRPr lang="en-US" sz="1200">
+                <a:solidFill>
+                  <a:schemeClr val="bg1"/>
+                </a:solidFill>
+                <a:latin typeface="Corbel" panose="020B0503020204020204" pitchFamily="34" charset="0"/>
+              </a:endParaRPr>
+            </a:p>
+          </p:txBody>
+        </p:sp>
+        <p:sp>
+          <p:nvSpPr>
+            <p:cNvPr id="16" name="Text Box 15"/>
+            <p:cNvSpPr txBox="1"/>
+            <p:nvPr/>
+          </p:nvSpPr>
+          <p:spPr>
+            <a:xfrm>
+              <a:off x="4119" y="6266"/>
+              <a:ext cx="938" cy="435"/>
+            </a:xfrm>
+            <a:prstGeom prst="rect">
+              <a:avLst/>
+            </a:prstGeom>
+            <a:noFill/>
+          </p:spPr>
+          <p:txBody>
+            <a:bodyPr wrap="none" rtlCol="0">
+              <a:spAutoFit/>
+            </a:bodyPr>
+            <a:p>
+              <a:r>
+                <a:rPr lang="en-US" sz="1200">
+                  <a:solidFill>
+                    <a:schemeClr val="bg1"/>
+                  </a:solidFill>
+                  <a:latin typeface="Corbel" panose="020B0503020204020204" pitchFamily="34" charset="0"/>
+                </a:rPr>
+                <a:t>iSense</a:t>
+              </a:r>
+              <a:endParaRPr lang="en-US" sz="1200">
+                <a:solidFill>
+                  <a:schemeClr val="bg1"/>
+                </a:solidFill>
+                <a:latin typeface="Corbel" panose="020B0503020204020204" pitchFamily="34" charset="0"/>
+              </a:endParaRPr>
+            </a:p>
+          </p:txBody>
+        </p:sp>
+        <p:sp>
+          <p:nvSpPr>
+            <p:cNvPr id="17" name="Text Box 16"/>
+            <p:cNvSpPr txBox="1"/>
+            <p:nvPr/>
+          </p:nvSpPr>
+          <p:spPr>
+            <a:xfrm>
+              <a:off x="4119" y="8329"/>
+              <a:ext cx="1943" cy="435"/>
+            </a:xfrm>
+            <a:prstGeom prst="rect">
+              <a:avLst/>
+            </a:prstGeom>
+            <a:noFill/>
+          </p:spPr>
+          <p:txBody>
+            <a:bodyPr wrap="none" rtlCol="0">
+              <a:spAutoFit/>
+            </a:bodyPr>
+            <a:p>
+              <a:r>
+                <a:rPr lang="en-US" sz="1200">
+                  <a:solidFill>
+                    <a:schemeClr val="bg1"/>
+                  </a:solidFill>
+                  <a:latin typeface="Corbel" panose="020B0503020204020204" pitchFamily="34" charset="0"/>
+                </a:rPr>
+                <a:t>Strucutre Sensor</a:t>
+              </a:r>
+              <a:endParaRPr lang="en-US" sz="1200">
+                <a:solidFill>
+                  <a:schemeClr val="bg1"/>
+                </a:solidFill>
+                <a:latin typeface="Corbel" panose="020B0503020204020204" pitchFamily="34" charset="0"/>
+              </a:endParaRPr>
+            </a:p>
+          </p:txBody>
+        </p:sp>
+      </p:grpSp>
+      <p:grpSp>
+        <p:nvGrpSpPr>
+          <p:cNvPr id="26" name="Group 25"/>
+          <p:cNvGrpSpPr/>
+          <p:nvPr/>
+        </p:nvGrpSpPr>
+        <p:grpSpPr>
+          <a:xfrm>
+            <a:off x="4828540" y="1078865"/>
+            <a:ext cx="3222625" cy="5036185"/>
+            <a:chOff x="7844" y="1699"/>
+            <a:chExt cx="5075" cy="7931"/>
+          </a:xfrm>
+        </p:grpSpPr>
+        <p:pic>
+          <p:nvPicPr>
+            <p:cNvPr id="9" name="Picture 8" descr="xyz-3d-scanner-review-product-close-up-1024x563"/>
+            <p:cNvPicPr>
+              <a:picLocks noChangeAspect="1"/>
+            </p:cNvPicPr>
+            <p:nvPr/>
+          </p:nvPicPr>
+          <p:blipFill>
+            <a:blip r:embed="rId5"/>
+            <a:stretch>
+              <a:fillRect/>
+            </a:stretch>
+          </p:blipFill>
+          <p:spPr>
+            <a:xfrm>
+              <a:off x="7844" y="1699"/>
+              <a:ext cx="3070" cy="1560"/>
+            </a:xfrm>
+            <a:prstGeom prst="rect">
+              <a:avLst/>
+            </a:prstGeom>
+          </p:spPr>
+        </p:pic>
+        <p:pic>
+          <p:nvPicPr>
+            <p:cNvPr id="10" name="Picture 9" descr="bevel-3d-photography-4"/>
+            <p:cNvPicPr>
+              <a:picLocks noChangeAspect="1"/>
+            </p:cNvPicPr>
+            <p:nvPr/>
+          </p:nvPicPr>
+          <p:blipFill>
+            <a:blip r:embed="rId6"/>
+            <a:stretch>
+              <a:fillRect/>
+            </a:stretch>
+          </p:blipFill>
+          <p:spPr>
+            <a:xfrm>
+              <a:off x="7844" y="3379"/>
+              <a:ext cx="3069" cy="2125"/>
+            </a:xfrm>
+            <a:prstGeom prst="rect">
+              <a:avLst/>
+            </a:prstGeom>
+          </p:spPr>
+        </p:pic>
+        <p:pic>
+          <p:nvPicPr>
+            <p:cNvPr id="11" name="Picture 10" descr="gsmarena_001"/>
+            <p:cNvPicPr>
+              <a:picLocks noChangeAspect="1"/>
+            </p:cNvPicPr>
+            <p:nvPr/>
+          </p:nvPicPr>
+          <p:blipFill>
+            <a:blip r:embed="rId7"/>
+            <a:stretch>
+              <a:fillRect/>
+            </a:stretch>
+          </p:blipFill>
+          <p:spPr>
+            <a:xfrm>
+              <a:off x="7844" y="5624"/>
+              <a:ext cx="3070" cy="1944"/>
+            </a:xfrm>
+            <a:prstGeom prst="rect">
+              <a:avLst/>
+            </a:prstGeom>
+          </p:spPr>
+        </p:pic>
+        <p:pic>
+          <p:nvPicPr>
+            <p:cNvPr id="12" name="Picture 11" descr="iphone_8_render_2"/>
+            <p:cNvPicPr>
+              <a:picLocks noChangeAspect="1"/>
+            </p:cNvPicPr>
+            <p:nvPr/>
+          </p:nvPicPr>
+          <p:blipFill>
+            <a:blip r:embed="rId8"/>
+            <a:stretch>
+              <a:fillRect/>
+            </a:stretch>
+          </p:blipFill>
+          <p:spPr>
+            <a:xfrm>
+              <a:off x="7844" y="7688"/>
+              <a:ext cx="3070" cy="1943"/>
+            </a:xfrm>
+            <a:prstGeom prst="rect">
+              <a:avLst/>
+            </a:prstGeom>
+          </p:spPr>
+        </p:pic>
+        <p:sp>
+          <p:nvSpPr>
+            <p:cNvPr id="18" name="Text Box 17"/>
+            <p:cNvSpPr txBox="1"/>
+            <p:nvPr/>
+          </p:nvSpPr>
+          <p:spPr>
+            <a:xfrm>
+              <a:off x="11039" y="2285"/>
+              <a:ext cx="1880" cy="435"/>
+            </a:xfrm>
+            <a:prstGeom prst="rect">
+              <a:avLst/>
+            </a:prstGeom>
+            <a:noFill/>
+          </p:spPr>
+          <p:txBody>
+            <a:bodyPr wrap="none" rtlCol="0">
+              <a:spAutoFit/>
+            </a:bodyPr>
+            <a:p>
+              <a:r>
+                <a:rPr lang="en-US" sz="1200">
+                  <a:solidFill>
+                    <a:schemeClr val="bg1"/>
+                  </a:solidFill>
+                  <a:latin typeface="Corbel" panose="020B0503020204020204" pitchFamily="34" charset="0"/>
+                </a:rPr>
+                <a:t>XYZ 3D Scanner</a:t>
+              </a:r>
+              <a:endParaRPr lang="en-US" sz="1200">
+                <a:solidFill>
+                  <a:schemeClr val="bg1"/>
+                </a:solidFill>
+                <a:latin typeface="Corbel" panose="020B0503020204020204" pitchFamily="34" charset="0"/>
+              </a:endParaRPr>
+            </a:p>
+          </p:txBody>
+        </p:sp>
+        <p:sp>
+          <p:nvSpPr>
+            <p:cNvPr id="19" name="Text Box 18"/>
+            <p:cNvSpPr txBox="1"/>
+            <p:nvPr/>
+          </p:nvSpPr>
+          <p:spPr>
+            <a:xfrm>
+              <a:off x="11039" y="4111"/>
+              <a:ext cx="1683" cy="435"/>
+            </a:xfrm>
+            <a:prstGeom prst="rect">
+              <a:avLst/>
+            </a:prstGeom>
+            <a:noFill/>
+          </p:spPr>
+          <p:txBody>
+            <a:bodyPr wrap="none" rtlCol="0">
+              <a:spAutoFit/>
+            </a:bodyPr>
+            <a:p>
+              <a:r>
+                <a:rPr lang="en-US" sz="1200">
+                  <a:solidFill>
+                    <a:schemeClr val="bg1"/>
+                  </a:solidFill>
+                  <a:latin typeface="Corbel" panose="020B0503020204020204" pitchFamily="34" charset="0"/>
+                </a:rPr>
+                <a:t>Bevel Scanner</a:t>
+              </a:r>
+              <a:endParaRPr lang="en-US" sz="1200">
+                <a:solidFill>
+                  <a:schemeClr val="bg1"/>
+                </a:solidFill>
+                <a:latin typeface="Corbel" panose="020B0503020204020204" pitchFamily="34" charset="0"/>
+              </a:endParaRPr>
+            </a:p>
+          </p:txBody>
+        </p:sp>
+        <p:sp>
+          <p:nvSpPr>
+            <p:cNvPr id="20" name="Text Box 19"/>
+            <p:cNvSpPr txBox="1"/>
+            <p:nvPr/>
+          </p:nvSpPr>
+          <p:spPr>
+            <a:xfrm>
+              <a:off x="11039" y="6266"/>
+              <a:ext cx="1644" cy="435"/>
+            </a:xfrm>
+            <a:prstGeom prst="rect">
+              <a:avLst/>
+            </a:prstGeom>
+            <a:noFill/>
+          </p:spPr>
+          <p:txBody>
+            <a:bodyPr wrap="none" rtlCol="0">
+              <a:spAutoFit/>
+            </a:bodyPr>
+            <a:p>
+              <a:r>
+                <a:rPr lang="en-US" sz="1200">
+                  <a:solidFill>
+                    <a:schemeClr val="bg1"/>
+                  </a:solidFill>
+                  <a:latin typeface="Corbel" panose="020B0503020204020204" pitchFamily="34" charset="0"/>
+                </a:rPr>
+                <a:t>Project Tango</a:t>
+              </a:r>
+              <a:endParaRPr lang="en-US" sz="1200">
+                <a:solidFill>
+                  <a:schemeClr val="bg1"/>
+                </a:solidFill>
+                <a:latin typeface="Corbel" panose="020B0503020204020204" pitchFamily="34" charset="0"/>
+              </a:endParaRPr>
+            </a:p>
+          </p:txBody>
+        </p:sp>
+        <p:sp>
+          <p:nvSpPr>
+            <p:cNvPr id="21" name="Text Box 20"/>
+            <p:cNvSpPr txBox="1"/>
+            <p:nvPr/>
+          </p:nvSpPr>
+          <p:spPr>
+            <a:xfrm>
+              <a:off x="11039" y="8329"/>
+              <a:ext cx="983" cy="435"/>
+            </a:xfrm>
+            <a:prstGeom prst="rect">
+              <a:avLst/>
+            </a:prstGeom>
+            <a:noFill/>
+          </p:spPr>
+          <p:txBody>
+            <a:bodyPr wrap="none" rtlCol="0">
+              <a:spAutoFit/>
+            </a:bodyPr>
+            <a:p>
+              <a:r>
+                <a:rPr lang="en-US" sz="1200">
+                  <a:solidFill>
+                    <a:schemeClr val="bg1"/>
+                  </a:solidFill>
+                  <a:latin typeface="Corbel" panose="020B0503020204020204" pitchFamily="34" charset="0"/>
+                </a:rPr>
+                <a:t>iPhone</a:t>
+              </a:r>
+              <a:endParaRPr lang="en-US" sz="1200">
+                <a:solidFill>
+                  <a:schemeClr val="bg1"/>
+                </a:solidFill>
+                <a:latin typeface="Corbel" panose="020B0503020204020204" pitchFamily="34" charset="0"/>
+              </a:endParaRPr>
+            </a:p>
+          </p:txBody>
+        </p:sp>
+        <p:sp>
+          <p:nvSpPr>
+            <p:cNvPr id="22" name="Text Box 21"/>
+            <p:cNvSpPr txBox="1"/>
+            <p:nvPr/>
+          </p:nvSpPr>
+          <p:spPr>
+            <a:xfrm>
+              <a:off x="11039" y="2285"/>
+              <a:ext cx="1880" cy="435"/>
+            </a:xfrm>
+            <a:prstGeom prst="rect">
+              <a:avLst/>
+            </a:prstGeom>
+            <a:noFill/>
+          </p:spPr>
+          <p:txBody>
+            <a:bodyPr wrap="none" rtlCol="0">
+              <a:spAutoFit/>
+            </a:bodyPr>
+            <a:p>
+              <a:r>
+                <a:rPr lang="en-US" sz="1200">
+                  <a:solidFill>
+                    <a:schemeClr val="bg1"/>
+                  </a:solidFill>
+                  <a:latin typeface="Corbel" panose="020B0503020204020204" pitchFamily="34" charset="0"/>
+                </a:rPr>
+                <a:t>XYZ 3D Scanner</a:t>
+              </a:r>
+              <a:endParaRPr lang="en-US" sz="1200">
+                <a:solidFill>
+                  <a:schemeClr val="bg1"/>
+                </a:solidFill>
+                <a:latin typeface="Corbel" panose="020B0503020204020204" pitchFamily="34" charset="0"/>
+              </a:endParaRPr>
+            </a:p>
+          </p:txBody>
+        </p:sp>
+        <p:sp>
+          <p:nvSpPr>
+            <p:cNvPr id="23" name="Text Box 22"/>
+            <p:cNvSpPr txBox="1"/>
+            <p:nvPr/>
+          </p:nvSpPr>
+          <p:spPr>
+            <a:xfrm>
+              <a:off x="11039" y="4111"/>
+              <a:ext cx="1683" cy="435"/>
+            </a:xfrm>
+            <a:prstGeom prst="rect">
+              <a:avLst/>
+            </a:prstGeom>
+            <a:noFill/>
+          </p:spPr>
+          <p:txBody>
+            <a:bodyPr wrap="none" rtlCol="0">
+              <a:spAutoFit/>
+            </a:bodyPr>
+            <a:p>
+              <a:r>
+                <a:rPr lang="en-US" sz="1200">
+                  <a:solidFill>
+                    <a:schemeClr val="bg1"/>
+                  </a:solidFill>
+                  <a:latin typeface="Corbel" panose="020B0503020204020204" pitchFamily="34" charset="0"/>
+                </a:rPr>
+                <a:t>Bevel Scanner</a:t>
+              </a:r>
+              <a:endParaRPr lang="en-US" sz="1200">
+                <a:solidFill>
+                  <a:schemeClr val="bg1"/>
+                </a:solidFill>
+                <a:latin typeface="Corbel" panose="020B0503020204020204" pitchFamily="34" charset="0"/>
+              </a:endParaRPr>
+            </a:p>
+          </p:txBody>
+        </p:sp>
+        <p:sp>
+          <p:nvSpPr>
+            <p:cNvPr id="24" name="Text Box 23"/>
+            <p:cNvSpPr txBox="1"/>
+            <p:nvPr/>
+          </p:nvSpPr>
+          <p:spPr>
+            <a:xfrm>
+              <a:off x="11039" y="6266"/>
+              <a:ext cx="1644" cy="435"/>
+            </a:xfrm>
+            <a:prstGeom prst="rect">
+              <a:avLst/>
+            </a:prstGeom>
+            <a:noFill/>
+          </p:spPr>
+          <p:txBody>
+            <a:bodyPr wrap="none" rtlCol="0">
+              <a:spAutoFit/>
+            </a:bodyPr>
+            <a:p>
+              <a:r>
+                <a:rPr lang="en-US" sz="1200">
+                  <a:solidFill>
+                    <a:schemeClr val="bg1"/>
+                  </a:solidFill>
+                  <a:latin typeface="Corbel" panose="020B0503020204020204" pitchFamily="34" charset="0"/>
+                </a:rPr>
+                <a:t>Project Tango</a:t>
+              </a:r>
+              <a:endParaRPr lang="en-US" sz="1200">
+                <a:solidFill>
+                  <a:schemeClr val="bg1"/>
+                </a:solidFill>
+                <a:latin typeface="Corbel" panose="020B0503020204020204" pitchFamily="34" charset="0"/>
+              </a:endParaRPr>
+            </a:p>
+          </p:txBody>
+        </p:sp>
+        <p:sp>
+          <p:nvSpPr>
+            <p:cNvPr id="25" name="Text Box 24"/>
+            <p:cNvSpPr txBox="1"/>
+            <p:nvPr/>
+          </p:nvSpPr>
+          <p:spPr>
+            <a:xfrm>
+              <a:off x="11039" y="8329"/>
+              <a:ext cx="983" cy="435"/>
+            </a:xfrm>
+            <a:prstGeom prst="rect">
+              <a:avLst/>
+            </a:prstGeom>
+            <a:noFill/>
+          </p:spPr>
+          <p:txBody>
+            <a:bodyPr wrap="none" rtlCol="0">
+              <a:spAutoFit/>
+            </a:bodyPr>
+            <a:p>
+              <a:r>
+                <a:rPr lang="en-US" sz="1200">
+                  <a:solidFill>
+                    <a:schemeClr val="bg1"/>
+                  </a:solidFill>
+                  <a:latin typeface="Corbel" panose="020B0503020204020204" pitchFamily="34" charset="0"/>
+                </a:rPr>
+                <a:t>iPhone</a:t>
+              </a:r>
+              <a:endParaRPr lang="en-US" sz="1200">
+                <a:solidFill>
+                  <a:schemeClr val="bg1"/>
+                </a:solidFill>
+                <a:latin typeface="Corbel" panose="020B0503020204020204" pitchFamily="34" charset="0"/>
+              </a:endParaRPr>
+            </a:p>
+          </p:txBody>
+        </p:sp>
+      </p:grpSp>
+    </p:spTree>
+  </p:cSld>
+  <p:clrMapOvr>
+    <a:masterClrMapping/>
+  </p:clrMapOvr>
+</p:sld>
+</file>
+
+<file path=ppt/slides/slide3.xml><?xml version="1.0" encoding="utf-8"?>
+<p:sld xmlns:a="http://schemas.openxmlformats.org/drawingml/2006/main" xmlns:r="http://schemas.openxmlformats.org/officeDocument/2006/relationships" xmlns:p="http://schemas.openxmlformats.org/presentationml/2006/main">
+  <p:cSld>
+    <p:spTree>
+      <p:nvGrpSpPr>
+        <p:cNvPr id="1" name=""/>
+        <p:cNvGrpSpPr/>
+        <p:nvPr/>
+      </p:nvGrpSpPr>
+      <p:grpSpPr/>
+      <p:sp>
+        <p:nvSpPr>
+          <p:cNvPr id="59" name="Rectangle 58"/>
+          <p:cNvSpPr/>
+          <p:nvPr/>
+        </p:nvSpPr>
+        <p:spPr>
+          <a:xfrm>
+            <a:off x="0" y="304800"/>
+            <a:ext cx="9144000" cy="457200"/>
+          </a:xfrm>
+          <a:prstGeom prst="rect">
+            <a:avLst/>
+          </a:prstGeom>
+        </p:spPr>
+        <p:style>
+          <a:lnRef idx="1">
+            <a:schemeClr val="accent1"/>
+          </a:lnRef>
+          <a:fillRef idx="3">
+            <a:schemeClr val="accent1"/>
+          </a:fillRef>
+          <a:effectRef idx="2">
+            <a:schemeClr val="accent1"/>
+          </a:effectRef>
+          <a:fontRef idx="minor">
+            <a:schemeClr val="lt1"/>
+          </a:fontRef>
+        </p:style>
+        <p:txBody>
+          <a:bodyPr rtlCol="0" anchor="ctr"/>
+          <a:p>
+            <a:r>
+              <a:rPr lang="en-US" dirty="0">
+                <a:latin typeface="Corbel" panose="020B0503020204020204" pitchFamily="34" charset="0"/>
+              </a:rPr>
+              <a:t>3D PRINTING BECOMES EASY</a:t>
+            </a:r>
+            <a:endParaRPr lang="en-US" dirty="0">
+              <a:latin typeface="Corbel" panose="020B0503020204020204" pitchFamily="34" charset="0"/>
+            </a:endParaRPr>
+          </a:p>
+        </p:txBody>
+      </p:sp>
+    </p:spTree>
   </p:cSld>
   <p:clrMapOvr>
     <a:masterClrMapping/>
@@ -4916,6 +5682,10 @@
       </a:style>
     </a:lnDef>
   </a:objectDefaults>
-  <a:extraClrSchemeLst/>
+  <a:extLst>
+    <a:ext uri="{05A4C25C-085E-4340-85A3-A5531E510DB2}">
+      <thm15:themeFamily xmlns:thm15="http://schemas.microsoft.com/office/thememl/2012/main" name="Office Theme" id="{62F939B6-93AF-4DB8-9C6B-D6C7DFDC589F}" vid="{4A3C46E8-61CC-4603-A589-7422A47A8E4A}"/>
+    </a:ext>
+  </a:extLst>
 </a:theme>
 </file>
</xml_diff>

<commit_message>
Updated analysis and presentation documents
</commit_message>
<xml_diff>
--- a/docs/products/market_analysis.pptx
+++ b/docs/products/market_analysis.pptx
@@ -5,9 +5,12 @@
     <p:sldMasterId id="2147483648" r:id="rId1"/>
   </p:sldMasterIdLst>
   <p:sldIdLst>
+    <p:sldId id="259" r:id="rId2"/>
     <p:sldId id="256" r:id="rId3"/>
     <p:sldId id="257" r:id="rId4"/>
-    <p:sldId id="258" r:id="rId5"/>
+    <p:sldId id="260" r:id="rId5"/>
+    <p:sldId id="264" r:id="rId6"/>
+    <p:sldId id="265" r:id="rId7"/>
   </p:sldIdLst>
   <p:sldSz cx="9144000" cy="6858000" type="screen4x3"/>
   <p:notesSz cx="6858000" cy="9144000"/>
@@ -290,6 +293,7 @@
           <a:p>
             <a:fld id="{8D52E752-28E5-4368-B467-FD45E17F2D0E}" type="datetimeFigureOut">
               <a:rPr lang="en-US" smtClean="0"/>
+              <a:t>7/13/2017</a:t>
             </a:fld>
             <a:endParaRPr lang="en-US"/>
           </a:p>
@@ -331,6 +335,7 @@
           <a:p>
             <a:fld id="{24EAE0EF-B234-4381-877B-176780D00FD9}" type="slidenum">
               <a:rPr lang="en-US" smtClean="0"/>
+              <a:t>‹#›</a:t>
             </a:fld>
             <a:endParaRPr lang="en-US"/>
           </a:p>
@@ -404,7 +409,6 @@
               <a:rPr lang="en-US" smtClean="0"/>
               <a:t>Click to edit Master text styles</a:t>
             </a:r>
-            <a:endParaRPr lang="en-US" smtClean="0"/>
           </a:p>
           <a:p>
             <a:pPr lvl="1"/>
@@ -412,7 +416,6 @@
               <a:rPr lang="en-US" smtClean="0"/>
               <a:t>Second level</a:t>
             </a:r>
-            <a:endParaRPr lang="en-US" smtClean="0"/>
           </a:p>
           <a:p>
             <a:pPr lvl="2"/>
@@ -420,7 +423,6 @@
               <a:rPr lang="en-US" smtClean="0"/>
               <a:t>Third level</a:t>
             </a:r>
-            <a:endParaRPr lang="en-US" smtClean="0"/>
           </a:p>
           <a:p>
             <a:pPr lvl="3"/>
@@ -428,7 +430,6 @@
               <a:rPr lang="en-US" smtClean="0"/>
               <a:t>Fourth level</a:t>
             </a:r>
-            <a:endParaRPr lang="en-US" smtClean="0"/>
           </a:p>
           <a:p>
             <a:pPr lvl="4"/>
@@ -457,6 +458,7 @@
           <a:p>
             <a:fld id="{8D52E752-28E5-4368-B467-FD45E17F2D0E}" type="datetimeFigureOut">
               <a:rPr lang="en-US" smtClean="0"/>
+              <a:t>7/13/2017</a:t>
             </a:fld>
             <a:endParaRPr lang="en-US"/>
           </a:p>
@@ -498,6 +500,7 @@
           <a:p>
             <a:fld id="{24EAE0EF-B234-4381-877B-176780D00FD9}" type="slidenum">
               <a:rPr lang="en-US" smtClean="0"/>
+              <a:t>‹#›</a:t>
             </a:fld>
             <a:endParaRPr lang="en-US"/>
           </a:p>
@@ -581,7 +584,6 @@
               <a:rPr lang="en-US" smtClean="0"/>
               <a:t>Click to edit Master text styles</a:t>
             </a:r>
-            <a:endParaRPr lang="en-US" smtClean="0"/>
           </a:p>
           <a:p>
             <a:pPr lvl="1"/>
@@ -589,7 +591,6 @@
               <a:rPr lang="en-US" smtClean="0"/>
               <a:t>Second level</a:t>
             </a:r>
-            <a:endParaRPr lang="en-US" smtClean="0"/>
           </a:p>
           <a:p>
             <a:pPr lvl="2"/>
@@ -597,7 +598,6 @@
               <a:rPr lang="en-US" smtClean="0"/>
               <a:t>Third level</a:t>
             </a:r>
-            <a:endParaRPr lang="en-US" smtClean="0"/>
           </a:p>
           <a:p>
             <a:pPr lvl="3"/>
@@ -605,7 +605,6 @@
               <a:rPr lang="en-US" smtClean="0"/>
               <a:t>Fourth level</a:t>
             </a:r>
-            <a:endParaRPr lang="en-US" smtClean="0"/>
           </a:p>
           <a:p>
             <a:pPr lvl="4"/>
@@ -634,6 +633,7 @@
           <a:p>
             <a:fld id="{8D52E752-28E5-4368-B467-FD45E17F2D0E}" type="datetimeFigureOut">
               <a:rPr lang="en-US" smtClean="0"/>
+              <a:t>7/13/2017</a:t>
             </a:fld>
             <a:endParaRPr lang="en-US"/>
           </a:p>
@@ -675,6 +675,7 @@
           <a:p>
             <a:fld id="{24EAE0EF-B234-4381-877B-176780D00FD9}" type="slidenum">
               <a:rPr lang="en-US" smtClean="0"/>
+              <a:t>‹#›</a:t>
             </a:fld>
             <a:endParaRPr lang="en-US"/>
           </a:p>
@@ -748,7 +749,6 @@
               <a:rPr lang="en-US" smtClean="0"/>
               <a:t>Click to edit Master text styles</a:t>
             </a:r>
-            <a:endParaRPr lang="en-US" smtClean="0"/>
           </a:p>
           <a:p>
             <a:pPr lvl="1"/>
@@ -756,7 +756,6 @@
               <a:rPr lang="en-US" smtClean="0"/>
               <a:t>Second level</a:t>
             </a:r>
-            <a:endParaRPr lang="en-US" smtClean="0"/>
           </a:p>
           <a:p>
             <a:pPr lvl="2"/>
@@ -764,7 +763,6 @@
               <a:rPr lang="en-US" smtClean="0"/>
               <a:t>Third level</a:t>
             </a:r>
-            <a:endParaRPr lang="en-US" smtClean="0"/>
           </a:p>
           <a:p>
             <a:pPr lvl="3"/>
@@ -772,7 +770,6 @@
               <a:rPr lang="en-US" smtClean="0"/>
               <a:t>Fourth level</a:t>
             </a:r>
-            <a:endParaRPr lang="en-US" smtClean="0"/>
           </a:p>
           <a:p>
             <a:pPr lvl="4"/>
@@ -801,6 +798,7 @@
           <a:p>
             <a:fld id="{8D52E752-28E5-4368-B467-FD45E17F2D0E}" type="datetimeFigureOut">
               <a:rPr lang="en-US" smtClean="0"/>
+              <a:t>7/13/2017</a:t>
             </a:fld>
             <a:endParaRPr lang="en-US"/>
           </a:p>
@@ -842,6 +840,7 @@
           <a:p>
             <a:fld id="{24EAE0EF-B234-4381-877B-176780D00FD9}" type="slidenum">
               <a:rPr lang="en-US" smtClean="0"/>
+              <a:t>‹#›</a:t>
             </a:fld>
             <a:endParaRPr lang="en-US"/>
           </a:p>
@@ -1020,7 +1019,6 @@
               <a:rPr lang="en-US" smtClean="0"/>
               <a:t>Click to edit Master text styles</a:t>
             </a:r>
-            <a:endParaRPr lang="en-US" smtClean="0"/>
           </a:p>
         </p:txBody>
       </p:sp>
@@ -1041,6 +1039,7 @@
           <a:p>
             <a:fld id="{8D52E752-28E5-4368-B467-FD45E17F2D0E}" type="datetimeFigureOut">
               <a:rPr lang="en-US" smtClean="0"/>
+              <a:t>7/13/2017</a:t>
             </a:fld>
             <a:endParaRPr lang="en-US"/>
           </a:p>
@@ -1082,6 +1081,7 @@
           <a:p>
             <a:fld id="{24EAE0EF-B234-4381-877B-176780D00FD9}" type="slidenum">
               <a:rPr lang="en-US" smtClean="0"/>
+              <a:t>‹#›</a:t>
             </a:fld>
             <a:endParaRPr lang="en-US"/>
           </a:p>
@@ -1188,7 +1188,6 @@
               <a:rPr lang="en-US" smtClean="0"/>
               <a:t>Click to edit Master text styles</a:t>
             </a:r>
-            <a:endParaRPr lang="en-US" smtClean="0"/>
           </a:p>
           <a:p>
             <a:pPr lvl="1"/>
@@ -1196,7 +1195,6 @@
               <a:rPr lang="en-US" smtClean="0"/>
               <a:t>Second level</a:t>
             </a:r>
-            <a:endParaRPr lang="en-US" smtClean="0"/>
           </a:p>
           <a:p>
             <a:pPr lvl="2"/>
@@ -1204,7 +1202,6 @@
               <a:rPr lang="en-US" smtClean="0"/>
               <a:t>Third level</a:t>
             </a:r>
-            <a:endParaRPr lang="en-US" smtClean="0"/>
           </a:p>
           <a:p>
             <a:pPr lvl="3"/>
@@ -1212,7 +1209,6 @@
               <a:rPr lang="en-US" smtClean="0"/>
               <a:t>Fourth level</a:t>
             </a:r>
-            <a:endParaRPr lang="en-US" smtClean="0"/>
           </a:p>
           <a:p>
             <a:pPr lvl="4"/>
@@ -1277,7 +1273,6 @@
               <a:rPr lang="en-US" smtClean="0"/>
               <a:t>Click to edit Master text styles</a:t>
             </a:r>
-            <a:endParaRPr lang="en-US" smtClean="0"/>
           </a:p>
           <a:p>
             <a:pPr lvl="1"/>
@@ -1285,7 +1280,6 @@
               <a:rPr lang="en-US" smtClean="0"/>
               <a:t>Second level</a:t>
             </a:r>
-            <a:endParaRPr lang="en-US" smtClean="0"/>
           </a:p>
           <a:p>
             <a:pPr lvl="2"/>
@@ -1293,7 +1287,6 @@
               <a:rPr lang="en-US" smtClean="0"/>
               <a:t>Third level</a:t>
             </a:r>
-            <a:endParaRPr lang="en-US" smtClean="0"/>
           </a:p>
           <a:p>
             <a:pPr lvl="3"/>
@@ -1301,7 +1294,6 @@
               <a:rPr lang="en-US" smtClean="0"/>
               <a:t>Fourth level</a:t>
             </a:r>
-            <a:endParaRPr lang="en-US" smtClean="0"/>
           </a:p>
           <a:p>
             <a:pPr lvl="4"/>
@@ -1330,6 +1322,7 @@
           <a:p>
             <a:fld id="{8D52E752-28E5-4368-B467-FD45E17F2D0E}" type="datetimeFigureOut">
               <a:rPr lang="en-US" smtClean="0"/>
+              <a:t>7/13/2017</a:t>
             </a:fld>
             <a:endParaRPr lang="en-US"/>
           </a:p>
@@ -1371,6 +1364,7 @@
           <a:p>
             <a:fld id="{24EAE0EF-B234-4381-877B-176780D00FD9}" type="slidenum">
               <a:rPr lang="en-US" smtClean="0"/>
+              <a:t>‹#›</a:t>
             </a:fld>
             <a:endParaRPr lang="en-US"/>
           </a:p>
@@ -1490,7 +1484,6 @@
               <a:rPr lang="en-US" smtClean="0"/>
               <a:t>Click to edit Master text styles</a:t>
             </a:r>
-            <a:endParaRPr lang="en-US" smtClean="0"/>
           </a:p>
         </p:txBody>
       </p:sp>
@@ -1547,7 +1540,6 @@
               <a:rPr lang="en-US" smtClean="0"/>
               <a:t>Click to edit Master text styles</a:t>
             </a:r>
-            <a:endParaRPr lang="en-US" smtClean="0"/>
           </a:p>
           <a:p>
             <a:pPr lvl="1"/>
@@ -1555,7 +1547,6 @@
               <a:rPr lang="en-US" smtClean="0"/>
               <a:t>Second level</a:t>
             </a:r>
-            <a:endParaRPr lang="en-US" smtClean="0"/>
           </a:p>
           <a:p>
             <a:pPr lvl="2"/>
@@ -1563,7 +1554,6 @@
               <a:rPr lang="en-US" smtClean="0"/>
               <a:t>Third level</a:t>
             </a:r>
-            <a:endParaRPr lang="en-US" smtClean="0"/>
           </a:p>
           <a:p>
             <a:pPr lvl="3"/>
@@ -1571,7 +1561,6 @@
               <a:rPr lang="en-US" smtClean="0"/>
               <a:t>Fourth level</a:t>
             </a:r>
-            <a:endParaRPr lang="en-US" smtClean="0"/>
           </a:p>
           <a:p>
             <a:pPr lvl="4"/>
@@ -1645,7 +1634,6 @@
               <a:rPr lang="en-US" smtClean="0"/>
               <a:t>Click to edit Master text styles</a:t>
             </a:r>
-            <a:endParaRPr lang="en-US" smtClean="0"/>
           </a:p>
         </p:txBody>
       </p:sp>
@@ -1702,7 +1690,6 @@
               <a:rPr lang="en-US" smtClean="0"/>
               <a:t>Click to edit Master text styles</a:t>
             </a:r>
-            <a:endParaRPr lang="en-US" smtClean="0"/>
           </a:p>
           <a:p>
             <a:pPr lvl="1"/>
@@ -1710,7 +1697,6 @@
               <a:rPr lang="en-US" smtClean="0"/>
               <a:t>Second level</a:t>
             </a:r>
-            <a:endParaRPr lang="en-US" smtClean="0"/>
           </a:p>
           <a:p>
             <a:pPr lvl="2"/>
@@ -1718,7 +1704,6 @@
               <a:rPr lang="en-US" smtClean="0"/>
               <a:t>Third level</a:t>
             </a:r>
-            <a:endParaRPr lang="en-US" smtClean="0"/>
           </a:p>
           <a:p>
             <a:pPr lvl="3"/>
@@ -1726,7 +1711,6 @@
               <a:rPr lang="en-US" smtClean="0"/>
               <a:t>Fourth level</a:t>
             </a:r>
-            <a:endParaRPr lang="en-US" smtClean="0"/>
           </a:p>
           <a:p>
             <a:pPr lvl="4"/>
@@ -1755,6 +1739,7 @@
           <a:p>
             <a:fld id="{8D52E752-28E5-4368-B467-FD45E17F2D0E}" type="datetimeFigureOut">
               <a:rPr lang="en-US" smtClean="0"/>
+              <a:t>7/13/2017</a:t>
             </a:fld>
             <a:endParaRPr lang="en-US"/>
           </a:p>
@@ -1796,6 +1781,7 @@
           <a:p>
             <a:fld id="{24EAE0EF-B234-4381-877B-176780D00FD9}" type="slidenum">
               <a:rPr lang="en-US" smtClean="0"/>
+              <a:t>‹#›</a:t>
             </a:fld>
             <a:endParaRPr lang="en-US"/>
           </a:p>
@@ -1866,6 +1852,7 @@
           <a:p>
             <a:fld id="{8D52E752-28E5-4368-B467-FD45E17F2D0E}" type="datetimeFigureOut">
               <a:rPr lang="en-US" smtClean="0"/>
+              <a:t>7/13/2017</a:t>
             </a:fld>
             <a:endParaRPr lang="en-US"/>
           </a:p>
@@ -1907,6 +1894,7 @@
           <a:p>
             <a:fld id="{24EAE0EF-B234-4381-877B-176780D00FD9}" type="slidenum">
               <a:rPr lang="en-US" smtClean="0"/>
+              <a:t>‹#›</a:t>
             </a:fld>
             <a:endParaRPr lang="en-US"/>
           </a:p>
@@ -1954,6 +1942,7 @@
           <a:p>
             <a:fld id="{8D52E752-28E5-4368-B467-FD45E17F2D0E}" type="datetimeFigureOut">
               <a:rPr lang="en-US" smtClean="0"/>
+              <a:t>7/13/2017</a:t>
             </a:fld>
             <a:endParaRPr lang="en-US"/>
           </a:p>
@@ -1995,6 +1984,7 @@
           <a:p>
             <a:fld id="{24EAE0EF-B234-4381-877B-176780D00FD9}" type="slidenum">
               <a:rPr lang="en-US" smtClean="0"/>
+              <a:t>‹#›</a:t>
             </a:fld>
             <a:endParaRPr lang="en-US"/>
           </a:p>
@@ -2110,7 +2100,6 @@
               <a:rPr lang="en-US" smtClean="0"/>
               <a:t>Click to edit Master text styles</a:t>
             </a:r>
-            <a:endParaRPr lang="en-US" smtClean="0"/>
           </a:p>
           <a:p>
             <a:pPr lvl="1"/>
@@ -2118,7 +2107,6 @@
               <a:rPr lang="en-US" smtClean="0"/>
               <a:t>Second level</a:t>
             </a:r>
-            <a:endParaRPr lang="en-US" smtClean="0"/>
           </a:p>
           <a:p>
             <a:pPr lvl="2"/>
@@ -2126,7 +2114,6 @@
               <a:rPr lang="en-US" smtClean="0"/>
               <a:t>Third level</a:t>
             </a:r>
-            <a:endParaRPr lang="en-US" smtClean="0"/>
           </a:p>
           <a:p>
             <a:pPr lvl="3"/>
@@ -2134,7 +2121,6 @@
               <a:rPr lang="en-US" smtClean="0"/>
               <a:t>Fourth level</a:t>
             </a:r>
-            <a:endParaRPr lang="en-US" smtClean="0"/>
           </a:p>
           <a:p>
             <a:pPr lvl="4"/>
@@ -2208,7 +2194,6 @@
               <a:rPr lang="en-US" smtClean="0"/>
               <a:t>Click to edit Master text styles</a:t>
             </a:r>
-            <a:endParaRPr lang="en-US" smtClean="0"/>
           </a:p>
         </p:txBody>
       </p:sp>
@@ -2229,6 +2214,7 @@
           <a:p>
             <a:fld id="{8D52E752-28E5-4368-B467-FD45E17F2D0E}" type="datetimeFigureOut">
               <a:rPr lang="en-US" smtClean="0"/>
+              <a:t>7/13/2017</a:t>
             </a:fld>
             <a:endParaRPr lang="en-US"/>
           </a:p>
@@ -2270,6 +2256,7 @@
           <a:p>
             <a:fld id="{24EAE0EF-B234-4381-877B-176780D00FD9}" type="slidenum">
               <a:rPr lang="en-US" smtClean="0"/>
+              <a:t>‹#›</a:t>
             </a:fld>
             <a:endParaRPr lang="en-US"/>
           </a:p>
@@ -2455,7 +2442,6 @@
               <a:rPr lang="en-US" smtClean="0"/>
               <a:t>Click to edit Master text styles</a:t>
             </a:r>
-            <a:endParaRPr lang="en-US" smtClean="0"/>
           </a:p>
         </p:txBody>
       </p:sp>
@@ -2476,6 +2462,7 @@
           <a:p>
             <a:fld id="{8D52E752-28E5-4368-B467-FD45E17F2D0E}" type="datetimeFigureOut">
               <a:rPr lang="en-US" smtClean="0"/>
+              <a:t>7/13/2017</a:t>
             </a:fld>
             <a:endParaRPr lang="en-US"/>
           </a:p>
@@ -2517,6 +2504,7 @@
           <a:p>
             <a:fld id="{24EAE0EF-B234-4381-877B-176780D00FD9}" type="slidenum">
               <a:rPr lang="en-US" smtClean="0"/>
+              <a:t>‹#›</a:t>
             </a:fld>
             <a:endParaRPr lang="en-US"/>
           </a:p>
@@ -2537,8 +2525,8 @@
       <p:bgPr>
         <a:solidFill>
           <a:schemeClr val="tx1">
-            <a:lumMod val="85000"/>
-            <a:lumOff val="15000"/>
+            <a:lumMod val="95000"/>
+            <a:lumOff val="5000"/>
           </a:schemeClr>
         </a:solidFill>
         <a:effectLst/>
@@ -2621,7 +2609,6 @@
               <a:rPr lang="en-US" smtClean="0"/>
               <a:t>Click to edit Master text styles</a:t>
             </a:r>
-            <a:endParaRPr lang="en-US" smtClean="0"/>
           </a:p>
           <a:p>
             <a:pPr lvl="1"/>
@@ -2629,7 +2616,6 @@
               <a:rPr lang="en-US" smtClean="0"/>
               <a:t>Second level</a:t>
             </a:r>
-            <a:endParaRPr lang="en-US" smtClean="0"/>
           </a:p>
           <a:p>
             <a:pPr lvl="2"/>
@@ -2637,7 +2623,6 @@
               <a:rPr lang="en-US" smtClean="0"/>
               <a:t>Third level</a:t>
             </a:r>
-            <a:endParaRPr lang="en-US" smtClean="0"/>
           </a:p>
           <a:p>
             <a:pPr lvl="3"/>
@@ -2645,7 +2630,6 @@
               <a:rPr lang="en-US" smtClean="0"/>
               <a:t>Fourth level</a:t>
             </a:r>
-            <a:endParaRPr lang="en-US" smtClean="0"/>
           </a:p>
           <a:p>
             <a:pPr lvl="4"/>
@@ -2692,6 +2676,7 @@
           <a:p>
             <a:fld id="{8D52E752-28E5-4368-B467-FD45E17F2D0E}" type="datetimeFigureOut">
               <a:rPr lang="en-US" smtClean="0"/>
+              <a:t>7/13/2017</a:t>
             </a:fld>
             <a:endParaRPr lang="en-US"/>
           </a:p>
@@ -2769,6 +2754,7 @@
           <a:p>
             <a:fld id="{24EAE0EF-B234-4381-877B-176780D00FD9}" type="slidenum">
               <a:rPr lang="en-US" smtClean="0"/>
+              <a:t>‹#›</a:t>
             </a:fld>
             <a:endParaRPr lang="en-US"/>
           </a:p>
@@ -3060,6 +3046,337 @@
           <a:chExt cx="0" cy="0"/>
         </a:xfrm>
       </p:grpSpPr>
+      <p:sp>
+        <p:nvSpPr>
+          <p:cNvPr id="4" name="Rectangle 3"/>
+          <p:cNvSpPr/>
+          <p:nvPr/>
+        </p:nvSpPr>
+        <p:spPr>
+          <a:xfrm>
+            <a:off x="0" y="304800"/>
+            <a:ext cx="9144000" cy="457200"/>
+          </a:xfrm>
+          <a:prstGeom prst="rect">
+            <a:avLst/>
+          </a:prstGeom>
+        </p:spPr>
+        <p:style>
+          <a:lnRef idx="1">
+            <a:schemeClr val="accent3"/>
+          </a:lnRef>
+          <a:fillRef idx="3">
+            <a:schemeClr val="accent3"/>
+          </a:fillRef>
+          <a:effectRef idx="2">
+            <a:schemeClr val="accent3"/>
+          </a:effectRef>
+          <a:fontRef idx="minor">
+            <a:schemeClr val="lt1"/>
+          </a:fontRef>
+        </p:style>
+        <p:txBody>
+          <a:bodyPr rtlCol="0" anchor="ctr"/>
+          <a:lstStyle/>
+          <a:p>
+            <a:r>
+              <a:rPr lang="en-US" dirty="0" smtClean="0">
+                <a:effectLst>
+                  <a:outerShdw blurRad="38100" dist="38100" dir="2700000" algn="tl">
+                    <a:srgbClr val="000000">
+                      <a:alpha val="43137"/>
+                    </a:srgbClr>
+                  </a:outerShdw>
+                </a:effectLst>
+                <a:latin typeface="Tempus Sans ITC" panose="04020404030D07020202" pitchFamily="82" charset="0"/>
+              </a:rPr>
+              <a:t>WHY WE NEED 3D SCANNING AND 3D PRINTING</a:t>
+            </a:r>
+            <a:endParaRPr lang="en-US" dirty="0">
+              <a:effectLst>
+                <a:outerShdw blurRad="38100" dist="38100" dir="2700000" algn="tl">
+                  <a:srgbClr val="000000">
+                    <a:alpha val="43137"/>
+                  </a:srgbClr>
+                </a:outerShdw>
+              </a:effectLst>
+              <a:latin typeface="Tempus Sans ITC" panose="04020404030D07020202" pitchFamily="82" charset="0"/>
+            </a:endParaRPr>
+          </a:p>
+        </p:txBody>
+      </p:sp>
+      <p:sp>
+        <p:nvSpPr>
+          <p:cNvPr id="7" name="TextBox 6"/>
+          <p:cNvSpPr txBox="1"/>
+          <p:nvPr/>
+        </p:nvSpPr>
+        <p:spPr>
+          <a:xfrm>
+            <a:off x="990600" y="1295400"/>
+            <a:ext cx="3347968" cy="3970318"/>
+          </a:xfrm>
+          <a:prstGeom prst="rect">
+            <a:avLst/>
+          </a:prstGeom>
+          <a:noFill/>
+        </p:spPr>
+        <p:txBody>
+          <a:bodyPr wrap="none" rtlCol="0">
+            <a:spAutoFit/>
+          </a:bodyPr>
+          <a:lstStyle/>
+          <a:p>
+            <a:pPr marL="285750" indent="-285750">
+              <a:buFont typeface="Arial" panose="020B0604020202020204" pitchFamily="34" charset="0"/>
+              <a:buChar char="•"/>
+            </a:pPr>
+            <a:r>
+              <a:rPr lang="en-US" dirty="0" smtClean="0">
+                <a:solidFill>
+                  <a:schemeClr val="bg1"/>
+                </a:solidFill>
+                <a:latin typeface="Corbel" panose="020B0503020204020204" pitchFamily="34" charset="0"/>
+              </a:rPr>
+              <a:t>3D Measurement</a:t>
+            </a:r>
+          </a:p>
+          <a:p>
+            <a:pPr marL="285750" indent="-285750">
+              <a:buFont typeface="Arial" panose="020B0604020202020204" pitchFamily="34" charset="0"/>
+              <a:buChar char="•"/>
+            </a:pPr>
+            <a:r>
+              <a:rPr lang="en-US" dirty="0" smtClean="0">
+                <a:solidFill>
+                  <a:schemeClr val="bg1"/>
+                </a:solidFill>
+                <a:latin typeface="Corbel" panose="020B0503020204020204" pitchFamily="34" charset="0"/>
+              </a:rPr>
+              <a:t>Interior Design</a:t>
+            </a:r>
+          </a:p>
+          <a:p>
+            <a:pPr marL="285750" indent="-285750">
+              <a:buFont typeface="Arial" panose="020B0604020202020204" pitchFamily="34" charset="0"/>
+              <a:buChar char="•"/>
+            </a:pPr>
+            <a:r>
+              <a:rPr lang="en-US" dirty="0" smtClean="0">
+                <a:solidFill>
+                  <a:schemeClr val="bg1"/>
+                </a:solidFill>
+                <a:latin typeface="Corbel" panose="020B0503020204020204" pitchFamily="34" charset="0"/>
+              </a:rPr>
+              <a:t>Interior Decoration</a:t>
+            </a:r>
+          </a:p>
+          <a:p>
+            <a:pPr marL="285750" indent="-285750">
+              <a:buFont typeface="Arial" panose="020B0604020202020204" pitchFamily="34" charset="0"/>
+              <a:buChar char="•"/>
+            </a:pPr>
+            <a:r>
+              <a:rPr lang="en-US" dirty="0" smtClean="0">
+                <a:solidFill>
+                  <a:schemeClr val="bg1"/>
+                </a:solidFill>
+                <a:latin typeface="Corbel" panose="020B0503020204020204" pitchFamily="34" charset="0"/>
+              </a:rPr>
+              <a:t>Customized Products</a:t>
+            </a:r>
+          </a:p>
+          <a:p>
+            <a:pPr marL="285750" indent="-285750">
+              <a:buFont typeface="Arial" panose="020B0604020202020204" pitchFamily="34" charset="0"/>
+              <a:buChar char="•"/>
+            </a:pPr>
+            <a:r>
+              <a:rPr lang="en-US" dirty="0" smtClean="0">
+                <a:solidFill>
+                  <a:schemeClr val="bg1"/>
+                </a:solidFill>
+                <a:latin typeface="Corbel" panose="020B0503020204020204" pitchFamily="34" charset="0"/>
+              </a:rPr>
+              <a:t>Old Parts Reproduction</a:t>
+            </a:r>
+          </a:p>
+          <a:p>
+            <a:pPr marL="285750" indent="-285750">
+              <a:buFont typeface="Arial" panose="020B0604020202020204" pitchFamily="34" charset="0"/>
+              <a:buChar char="•"/>
+            </a:pPr>
+            <a:r>
+              <a:rPr lang="en-US" dirty="0" smtClean="0">
+                <a:solidFill>
+                  <a:schemeClr val="bg1"/>
+                </a:solidFill>
+                <a:latin typeface="Corbel" panose="020B0503020204020204" pitchFamily="34" charset="0"/>
+              </a:rPr>
+              <a:t>One of a Kind Ornaments</a:t>
+            </a:r>
+          </a:p>
+          <a:p>
+            <a:pPr marL="285750" indent="-285750">
+              <a:buFont typeface="Arial" panose="020B0604020202020204" pitchFamily="34" charset="0"/>
+              <a:buChar char="•"/>
+            </a:pPr>
+            <a:r>
+              <a:rPr lang="en-US" dirty="0" smtClean="0">
+                <a:solidFill>
+                  <a:schemeClr val="bg1"/>
+                </a:solidFill>
+                <a:latin typeface="Corbel" panose="020B0503020204020204" pitchFamily="34" charset="0"/>
+              </a:rPr>
+              <a:t>One of a Kind Toys and Games</a:t>
+            </a:r>
+          </a:p>
+          <a:p>
+            <a:pPr marL="285750" indent="-285750">
+              <a:buFont typeface="Arial" panose="020B0604020202020204" pitchFamily="34" charset="0"/>
+              <a:buChar char="•"/>
+            </a:pPr>
+            <a:r>
+              <a:rPr lang="en-US" dirty="0">
+                <a:solidFill>
+                  <a:schemeClr val="bg1"/>
+                </a:solidFill>
+                <a:latin typeface="Corbel" panose="020B0503020204020204" pitchFamily="34" charset="0"/>
+              </a:rPr>
+              <a:t>One of a Kind Medical Devices</a:t>
+            </a:r>
+          </a:p>
+          <a:p>
+            <a:pPr marL="285750" indent="-285750">
+              <a:buFont typeface="Arial" panose="020B0604020202020204" pitchFamily="34" charset="0"/>
+              <a:buChar char="•"/>
+            </a:pPr>
+            <a:r>
+              <a:rPr lang="en-US" dirty="0" smtClean="0">
+                <a:solidFill>
+                  <a:schemeClr val="bg1"/>
+                </a:solidFill>
+                <a:latin typeface="Corbel" panose="020B0503020204020204" pitchFamily="34" charset="0"/>
+              </a:rPr>
+              <a:t>Art Pieces</a:t>
+            </a:r>
+          </a:p>
+          <a:p>
+            <a:pPr marL="285750" indent="-285750">
+              <a:buFont typeface="Arial" panose="020B0604020202020204" pitchFamily="34" charset="0"/>
+              <a:buChar char="•"/>
+            </a:pPr>
+            <a:r>
+              <a:rPr lang="en-US" dirty="0" smtClean="0">
+                <a:solidFill>
+                  <a:schemeClr val="bg1"/>
+                </a:solidFill>
+                <a:latin typeface="Corbel" panose="020B0503020204020204" pitchFamily="34" charset="0"/>
+              </a:rPr>
+              <a:t>Food Production</a:t>
+            </a:r>
+          </a:p>
+          <a:p>
+            <a:pPr marL="285750" indent="-285750">
+              <a:buFont typeface="Arial" panose="020B0604020202020204" pitchFamily="34" charset="0"/>
+              <a:buChar char="•"/>
+            </a:pPr>
+            <a:r>
+              <a:rPr lang="en-US" dirty="0">
+                <a:solidFill>
+                  <a:schemeClr val="bg1"/>
+                </a:solidFill>
+                <a:latin typeface="Corbel" panose="020B0503020204020204" pitchFamily="34" charset="0"/>
+              </a:rPr>
+              <a:t>Apparel </a:t>
+            </a:r>
+            <a:r>
+              <a:rPr lang="en-US" dirty="0" smtClean="0">
+                <a:solidFill>
+                  <a:schemeClr val="bg1"/>
+                </a:solidFill>
+                <a:latin typeface="Corbel" panose="020B0503020204020204" pitchFamily="34" charset="0"/>
+              </a:rPr>
+              <a:t> and  Fashion</a:t>
+            </a:r>
+          </a:p>
+          <a:p>
+            <a:pPr marL="285750" indent="-285750">
+              <a:buFont typeface="Arial" panose="020B0604020202020204" pitchFamily="34" charset="0"/>
+              <a:buChar char="•"/>
+            </a:pPr>
+            <a:r>
+              <a:rPr lang="en-US" dirty="0" smtClean="0">
+                <a:solidFill>
+                  <a:schemeClr val="bg1"/>
+                </a:solidFill>
+                <a:latin typeface="Corbel" panose="020B0503020204020204" pitchFamily="34" charset="0"/>
+              </a:rPr>
+              <a:t>Educational Models</a:t>
+            </a:r>
+          </a:p>
+          <a:p>
+            <a:pPr marL="285750" indent="-285750">
+              <a:buFont typeface="Arial" panose="020B0604020202020204" pitchFamily="34" charset="0"/>
+              <a:buChar char="•"/>
+            </a:pPr>
+            <a:r>
+              <a:rPr lang="en-US" dirty="0" smtClean="0">
+                <a:solidFill>
+                  <a:schemeClr val="bg1"/>
+                </a:solidFill>
+                <a:latin typeface="Corbel" panose="020B0503020204020204" pitchFamily="34" charset="0"/>
+              </a:rPr>
+              <a:t>Rapid Prototyping</a:t>
+            </a:r>
+          </a:p>
+          <a:p>
+            <a:pPr marL="285750" indent="-285750">
+              <a:buFont typeface="Arial" panose="020B0604020202020204" pitchFamily="34" charset="0"/>
+              <a:buChar char="•"/>
+            </a:pPr>
+            <a:r>
+              <a:rPr lang="en-US" dirty="0" smtClean="0">
+                <a:solidFill>
+                  <a:schemeClr val="bg1"/>
+                </a:solidFill>
+                <a:latin typeface="Corbel" panose="020B0503020204020204" pitchFamily="34" charset="0"/>
+              </a:rPr>
+              <a:t>…</a:t>
+            </a:r>
+          </a:p>
+        </p:txBody>
+      </p:sp>
+    </p:spTree>
+    <p:extLst>
+      <p:ext uri="{BB962C8B-B14F-4D97-AF65-F5344CB8AC3E}">
+        <p14:creationId xmlns:p14="http://schemas.microsoft.com/office/powerpoint/2010/main" val="3781244953"/>
+      </p:ext>
+    </p:extLst>
+  </p:cSld>
+  <p:clrMapOvr>
+    <a:masterClrMapping/>
+  </p:clrMapOvr>
+</p:sld>
+</file>
+
+<file path=ppt/slides/slide2.xml><?xml version="1.0" encoding="utf-8"?>
+<p:sld xmlns:a="http://schemas.openxmlformats.org/drawingml/2006/main" xmlns:r="http://schemas.openxmlformats.org/officeDocument/2006/relationships" xmlns:p="http://schemas.openxmlformats.org/presentationml/2006/main">
+  <p:cSld>
+    <p:spTree>
+      <p:nvGrpSpPr>
+        <p:cNvPr id="1" name=""/>
+        <p:cNvGrpSpPr/>
+        <p:nvPr/>
+      </p:nvGrpSpPr>
+      <p:grpSpPr>
+        <a:xfrm>
+          <a:off x="0" y="0"/>
+          <a:ext cx="0" cy="0"/>
+          <a:chOff x="0" y="0"/>
+          <a:chExt cx="0" cy="0"/>
+        </a:xfrm>
+      </p:grpSpPr>
       <p:grpSp>
         <p:nvGrpSpPr>
           <p:cNvPr id="88" name="Group 87"/>
@@ -3089,7 +3406,7 @@
               <a:avLst/>
             </a:prstGeom>
             <a:blipFill dpi="0" rotWithShape="1">
-              <a:blip r:embed="rId1">
+              <a:blip r:embed="rId2">
                 <a:alphaModFix amt="65000"/>
                 <a:duotone>
                   <a:schemeClr val="accent1">
@@ -3148,7 +3465,7 @@
               <a:avLst/>
             </a:prstGeom>
             <a:blipFill dpi="0" rotWithShape="1">
-              <a:blip r:embed="rId2">
+              <a:blip r:embed="rId3">
                 <a:alphaModFix amt="65000"/>
                 <a:duotone>
                   <a:schemeClr val="accent1">
@@ -3207,7 +3524,7 @@
               <a:avLst/>
             </a:prstGeom>
             <a:blipFill dpi="0" rotWithShape="1">
-              <a:blip r:embed="rId3">
+              <a:blip r:embed="rId4">
                 <a:alphaModFix amt="65000"/>
                 <a:duotone>
                   <a:schemeClr val="accent2">
@@ -3266,7 +3583,7 @@
               <a:avLst/>
             </a:prstGeom>
             <a:blipFill dpi="0" rotWithShape="1">
-              <a:blip r:embed="rId4">
+              <a:blip r:embed="rId5">
                 <a:alphaModFix amt="65000"/>
                 <a:duotone>
                   <a:schemeClr val="accent1">
@@ -3328,13 +3645,13 @@
         </p:spPr>
         <p:style>
           <a:lnRef idx="1">
-            <a:schemeClr val="accent1"/>
+            <a:schemeClr val="accent3"/>
           </a:lnRef>
           <a:fillRef idx="3">
-            <a:schemeClr val="accent1"/>
+            <a:schemeClr val="accent3"/>
           </a:fillRef>
           <a:effectRef idx="2">
-            <a:schemeClr val="accent1"/>
+            <a:schemeClr val="accent3"/>
           </a:effectRef>
           <a:fontRef idx="minor">
             <a:schemeClr val="lt1"/>
@@ -3346,12 +3663,26 @@
           <a:p>
             <a:r>
               <a:rPr lang="en-US" dirty="0" smtClean="0">
-                <a:latin typeface="Corbel" panose="020B0503020204020204" pitchFamily="34" charset="0"/>
+                <a:effectLst>
+                  <a:outerShdw blurRad="38100" dist="38100" dir="2700000" algn="tl">
+                    <a:srgbClr val="000000">
+                      <a:alpha val="43137"/>
+                    </a:srgbClr>
+                  </a:outerShdw>
+                </a:effectLst>
+                <a:latin typeface="Tempus Sans ITC" panose="04020404030D07020202" pitchFamily="82" charset="0"/>
               </a:rPr>
-              <a:t>PROCESS OVERVIEW</a:t>
+              <a:t>FROM 3D SCANNING TO 3D PRINTING</a:t>
             </a:r>
             <a:endParaRPr lang="en-US" dirty="0">
-              <a:latin typeface="Corbel" panose="020B0503020204020204" pitchFamily="34" charset="0"/>
+              <a:effectLst>
+                <a:outerShdw blurRad="38100" dist="38100" dir="2700000" algn="tl">
+                  <a:srgbClr val="000000">
+                    <a:alpha val="43137"/>
+                  </a:srgbClr>
+                </a:outerShdw>
+              </a:effectLst>
+              <a:latin typeface="Tempus Sans ITC" panose="04020404030D07020202" pitchFamily="82" charset="0"/>
             </a:endParaRPr>
           </a:p>
         </p:txBody>
@@ -3703,16 +4034,6 @@
               </a:rPr>
               <a:t>G-Code Generation</a:t>
             </a:r>
-            <a:endParaRPr lang="en-US" sz="1100" b="1" dirty="0">
-              <a:effectLst>
-                <a:outerShdw blurRad="38100" dist="38100" dir="2700000" algn="tl">
-                  <a:srgbClr val="000000">
-                    <a:alpha val="43137"/>
-                  </a:srgbClr>
-                </a:outerShdw>
-              </a:effectLst>
-              <a:latin typeface="Corbel" panose="020B0503020204020204" pitchFamily="34" charset="0"/>
-            </a:endParaRPr>
           </a:p>
         </p:txBody>
       </p:sp>
@@ -3763,16 +4084,6 @@
               </a:rPr>
               <a:t>Mesh Slicing</a:t>
             </a:r>
-            <a:endParaRPr lang="en-US" sz="1100" b="1" dirty="0">
-              <a:effectLst>
-                <a:outerShdw blurRad="38100" dist="38100" dir="2700000" algn="tl">
-                  <a:srgbClr val="000000">
-                    <a:alpha val="43137"/>
-                  </a:srgbClr>
-                </a:outerShdw>
-              </a:effectLst>
-              <a:latin typeface="Corbel" panose="020B0503020204020204" pitchFamily="34" charset="0"/>
-            </a:endParaRPr>
           </a:p>
         </p:txBody>
       </p:sp>
@@ -3823,16 +4134,6 @@
               </a:rPr>
               <a:t>3DPrinting Pre-processing</a:t>
             </a:r>
-            <a:endParaRPr lang="en-US" sz="1100" b="1" dirty="0">
-              <a:effectLst>
-                <a:outerShdw blurRad="38100" dist="38100" dir="2700000" algn="tl">
-                  <a:srgbClr val="000000">
-                    <a:alpha val="43137"/>
-                  </a:srgbClr>
-                </a:outerShdw>
-              </a:effectLst>
-              <a:latin typeface="Corbel" panose="020B0503020204020204" pitchFamily="34" charset="0"/>
-            </a:endParaRPr>
           </a:p>
         </p:txBody>
       </p:sp>
@@ -4409,16 +4710,6 @@
               </a:rPr>
               <a:t>3D Printing</a:t>
             </a:r>
-            <a:endParaRPr lang="en-US" sz="1100" b="1" dirty="0">
-              <a:effectLst>
-                <a:outerShdw blurRad="38100" dist="38100" dir="2700000" algn="tl">
-                  <a:srgbClr val="000000">
-                    <a:alpha val="43137"/>
-                  </a:srgbClr>
-                </a:outerShdw>
-              </a:effectLst>
-              <a:latin typeface="Corbel" panose="020B0503020204020204" pitchFamily="34" charset="0"/>
-            </a:endParaRPr>
           </a:p>
         </p:txBody>
       </p:sp>
@@ -4520,7 +4811,7 @@
             <a:avLst/>
           </a:prstGeom>
           <a:blipFill>
-            <a:blip r:embed="rId5"/>
+            <a:blip r:embed="rId6"/>
             <a:stretch>
               <a:fillRect l="-33336" r="-2775"/>
             </a:stretch>
@@ -4562,7 +4853,7 @@
 </p:sld>
 </file>
 
-<file path=ppt/slides/slide2.xml><?xml version="1.0" encoding="utf-8"?>
+<file path=ppt/slides/slide3.xml><?xml version="1.0" encoding="utf-8"?>
 <p:sld xmlns:a="http://schemas.openxmlformats.org/drawingml/2006/main" xmlns:r="http://schemas.openxmlformats.org/officeDocument/2006/relationships" xmlns:p="http://schemas.openxmlformats.org/presentationml/2006/main">
   <p:cSld>
     <p:spTree>
@@ -4571,7 +4862,14 @@
         <p:cNvGrpSpPr/>
         <p:nvPr/>
       </p:nvGrpSpPr>
-      <p:grpSpPr/>
+      <p:grpSpPr>
+        <a:xfrm>
+          <a:off x="0" y="0"/>
+          <a:ext cx="0" cy="0"/>
+          <a:chOff x="0" y="0"/>
+          <a:chExt cx="0" cy="0"/>
+        </a:xfrm>
+      </p:grpSpPr>
       <p:sp>
         <p:nvSpPr>
           <p:cNvPr id="59" name="Rectangle 58"/>
@@ -4589,13 +4887,13 @@
         </p:spPr>
         <p:style>
           <a:lnRef idx="1">
-            <a:schemeClr val="accent1"/>
+            <a:schemeClr val="accent3"/>
           </a:lnRef>
           <a:fillRef idx="3">
-            <a:schemeClr val="accent1"/>
+            <a:schemeClr val="accent3"/>
           </a:fillRef>
           <a:effectRef idx="2">
-            <a:schemeClr val="accent1"/>
+            <a:schemeClr val="accent3"/>
           </a:effectRef>
           <a:fontRef idx="minor">
             <a:schemeClr val="lt1"/>
@@ -4603,15 +4901,43 @@
         </p:style>
         <p:txBody>
           <a:bodyPr rtlCol="0" anchor="ctr"/>
+          <a:lstStyle/>
           <a:p>
             <a:r>
               <a:rPr lang="en-US" dirty="0">
-                <a:latin typeface="Corbel" panose="020B0503020204020204" pitchFamily="34" charset="0"/>
+                <a:effectLst>
+                  <a:outerShdw blurRad="38100" dist="38100" dir="2700000" algn="tl">
+                    <a:srgbClr val="000000">
+                      <a:alpha val="43137"/>
+                    </a:srgbClr>
+                  </a:outerShdw>
+                </a:effectLst>
+                <a:latin typeface="Tempus Sans ITC" panose="04020404030D07020202" pitchFamily="82" charset="0"/>
               </a:rPr>
-              <a:t>3D SCANNING BECOMES EASY</a:t>
+              <a:t>3D </a:t>
+            </a:r>
+            <a:r>
+              <a:rPr lang="en-US" dirty="0" smtClean="0">
+                <a:effectLst>
+                  <a:outerShdw blurRad="38100" dist="38100" dir="2700000" algn="tl">
+                    <a:srgbClr val="000000">
+                      <a:alpha val="43137"/>
+                    </a:srgbClr>
+                  </a:outerShdw>
+                </a:effectLst>
+                <a:latin typeface="Tempus Sans ITC" panose="04020404030D07020202" pitchFamily="82" charset="0"/>
+              </a:rPr>
+              <a:t>SCANNING BECOMES EASY</a:t>
             </a:r>
             <a:endParaRPr lang="en-US" dirty="0">
-              <a:latin typeface="Corbel" panose="020B0503020204020204" pitchFamily="34" charset="0"/>
+              <a:effectLst>
+                <a:outerShdw blurRad="38100" dist="38100" dir="2700000" algn="tl">
+                  <a:srgbClr val="000000">
+                    <a:alpha val="43137"/>
+                  </a:srgbClr>
+                </a:outerShdw>
+              </a:effectLst>
+              <a:latin typeface="Tempus Sans ITC" panose="04020404030D07020202" pitchFamily="82" charset="0"/>
             </a:endParaRPr>
           </a:p>
         </p:txBody>
@@ -4639,7 +4965,7 @@
             <p:nvPr/>
           </p:nvPicPr>
           <p:blipFill>
-            <a:blip r:embed="rId1"/>
+            <a:blip r:embed="rId2"/>
             <a:stretch>
               <a:fillRect/>
             </a:stretch>
@@ -4663,7 +4989,7 @@
             <p:nvPr/>
           </p:nvPicPr>
           <p:blipFill>
-            <a:blip r:embed="rId2"/>
+            <a:blip r:embed="rId3"/>
             <a:stretch>
               <a:fillRect/>
             </a:stretch>
@@ -4687,7 +5013,7 @@
             <p:nvPr/>
           </p:nvPicPr>
           <p:blipFill>
-            <a:blip r:embed="rId3"/>
+            <a:blip r:embed="rId4"/>
             <a:stretch>
               <a:fillRect/>
             </a:stretch>
@@ -4711,7 +5037,7 @@
             <p:nvPr/>
           </p:nvPicPr>
           <p:blipFill>
-            <a:blip r:embed="rId4"/>
+            <a:blip r:embed="rId5"/>
             <a:stretch>
               <a:fillRect/>
             </a:stretch>
@@ -4746,6 +5072,7 @@
             <a:bodyPr wrap="none" rtlCol="0">
               <a:spAutoFit/>
             </a:bodyPr>
+            <a:lstStyle/>
             <a:p>
               <a:r>
                 <a:rPr lang="en-US" sz="1200">
@@ -4756,12 +5083,6 @@
                 </a:rPr>
                 <a:t>XBOX ONE</a:t>
               </a:r>
-              <a:endParaRPr lang="en-US" sz="1200">
-                <a:solidFill>
-                  <a:schemeClr val="bg1"/>
-                </a:solidFill>
-                <a:latin typeface="Corbel" panose="020B0503020204020204" pitchFamily="34" charset="0"/>
-              </a:endParaRPr>
             </a:p>
           </p:txBody>
         </p:sp>
@@ -4785,9 +5106,10 @@
             <a:bodyPr wrap="none" rtlCol="0">
               <a:spAutoFit/>
             </a:bodyPr>
+            <a:lstStyle/>
             <a:p>
               <a:r>
-                <a:rPr lang="en-US" sz="1200">
+                <a:rPr lang="en-US" sz="1200" dirty="0">
                   <a:solidFill>
                     <a:schemeClr val="bg1"/>
                   </a:solidFill>
@@ -4795,12 +5117,6 @@
                 </a:rPr>
                 <a:t>Sense</a:t>
               </a:r>
-              <a:endParaRPr lang="en-US" sz="1200">
-                <a:solidFill>
-                  <a:schemeClr val="bg1"/>
-                </a:solidFill>
-                <a:latin typeface="Corbel" panose="020B0503020204020204" pitchFamily="34" charset="0"/>
-              </a:endParaRPr>
             </a:p>
           </p:txBody>
         </p:sp>
@@ -4824,6 +5140,7 @@
             <a:bodyPr wrap="none" rtlCol="0">
               <a:spAutoFit/>
             </a:bodyPr>
+            <a:lstStyle/>
             <a:p>
               <a:r>
                 <a:rPr lang="en-US" sz="1200">
@@ -4834,12 +5151,6 @@
                 </a:rPr>
                 <a:t>iSense</a:t>
               </a:r>
-              <a:endParaRPr lang="en-US" sz="1200">
-                <a:solidFill>
-                  <a:schemeClr val="bg1"/>
-                </a:solidFill>
-                <a:latin typeface="Corbel" panose="020B0503020204020204" pitchFamily="34" charset="0"/>
-              </a:endParaRPr>
             </a:p>
           </p:txBody>
         </p:sp>
@@ -4863,6 +5174,7 @@
             <a:bodyPr wrap="none" rtlCol="0">
               <a:spAutoFit/>
             </a:bodyPr>
+            <a:lstStyle/>
             <a:p>
               <a:r>
                 <a:rPr lang="en-US" sz="1200">
@@ -4873,12 +5185,6 @@
                 </a:rPr>
                 <a:t>Strucutre Sensor</a:t>
               </a:r>
-              <a:endParaRPr lang="en-US" sz="1200">
-                <a:solidFill>
-                  <a:schemeClr val="bg1"/>
-                </a:solidFill>
-                <a:latin typeface="Corbel" panose="020B0503020204020204" pitchFamily="34" charset="0"/>
-              </a:endParaRPr>
             </a:p>
           </p:txBody>
         </p:sp>
@@ -4906,7 +5212,7 @@
             <p:nvPr/>
           </p:nvPicPr>
           <p:blipFill>
-            <a:blip r:embed="rId5"/>
+            <a:blip r:embed="rId6"/>
             <a:stretch>
               <a:fillRect/>
             </a:stretch>
@@ -4930,7 +5236,7 @@
             <p:nvPr/>
           </p:nvPicPr>
           <p:blipFill>
-            <a:blip r:embed="rId6"/>
+            <a:blip r:embed="rId7"/>
             <a:stretch>
               <a:fillRect/>
             </a:stretch>
@@ -4954,7 +5260,7 @@
             <p:nvPr/>
           </p:nvPicPr>
           <p:blipFill>
-            <a:blip r:embed="rId7"/>
+            <a:blip r:embed="rId8"/>
             <a:stretch>
               <a:fillRect/>
             </a:stretch>
@@ -4978,7 +5284,7 @@
             <p:nvPr/>
           </p:nvPicPr>
           <p:blipFill>
-            <a:blip r:embed="rId8"/>
+            <a:blip r:embed="rId9"/>
             <a:stretch>
               <a:fillRect/>
             </a:stretch>
@@ -5013,6 +5319,7 @@
             <a:bodyPr wrap="none" rtlCol="0">
               <a:spAutoFit/>
             </a:bodyPr>
+            <a:lstStyle/>
             <a:p>
               <a:r>
                 <a:rPr lang="en-US" sz="1200">
@@ -5023,12 +5330,6 @@
                 </a:rPr>
                 <a:t>XYZ 3D Scanner</a:t>
               </a:r>
-              <a:endParaRPr lang="en-US" sz="1200">
-                <a:solidFill>
-                  <a:schemeClr val="bg1"/>
-                </a:solidFill>
-                <a:latin typeface="Corbel" panose="020B0503020204020204" pitchFamily="34" charset="0"/>
-              </a:endParaRPr>
             </a:p>
           </p:txBody>
         </p:sp>
@@ -5052,6 +5353,7 @@
             <a:bodyPr wrap="none" rtlCol="0">
               <a:spAutoFit/>
             </a:bodyPr>
+            <a:lstStyle/>
             <a:p>
               <a:r>
                 <a:rPr lang="en-US" sz="1200">
@@ -5062,12 +5364,6 @@
                 </a:rPr>
                 <a:t>Bevel Scanner</a:t>
               </a:r>
-              <a:endParaRPr lang="en-US" sz="1200">
-                <a:solidFill>
-                  <a:schemeClr val="bg1"/>
-                </a:solidFill>
-                <a:latin typeface="Corbel" panose="020B0503020204020204" pitchFamily="34" charset="0"/>
-              </a:endParaRPr>
             </a:p>
           </p:txBody>
         </p:sp>
@@ -5091,6 +5387,7 @@
             <a:bodyPr wrap="none" rtlCol="0">
               <a:spAutoFit/>
             </a:bodyPr>
+            <a:lstStyle/>
             <a:p>
               <a:r>
                 <a:rPr lang="en-US" sz="1200">
@@ -5101,12 +5398,6 @@
                 </a:rPr>
                 <a:t>Project Tango</a:t>
               </a:r>
-              <a:endParaRPr lang="en-US" sz="1200">
-                <a:solidFill>
-                  <a:schemeClr val="bg1"/>
-                </a:solidFill>
-                <a:latin typeface="Corbel" panose="020B0503020204020204" pitchFamily="34" charset="0"/>
-              </a:endParaRPr>
             </a:p>
           </p:txBody>
         </p:sp>
@@ -5130,6 +5421,7 @@
             <a:bodyPr wrap="none" rtlCol="0">
               <a:spAutoFit/>
             </a:bodyPr>
+            <a:lstStyle/>
             <a:p>
               <a:r>
                 <a:rPr lang="en-US" sz="1200">
@@ -5140,12 +5432,6 @@
                 </a:rPr>
                 <a:t>iPhone</a:t>
               </a:r>
-              <a:endParaRPr lang="en-US" sz="1200">
-                <a:solidFill>
-                  <a:schemeClr val="bg1"/>
-                </a:solidFill>
-                <a:latin typeface="Corbel" panose="020B0503020204020204" pitchFamily="34" charset="0"/>
-              </a:endParaRPr>
             </a:p>
           </p:txBody>
         </p:sp>
@@ -5169,6 +5455,7 @@
             <a:bodyPr wrap="none" rtlCol="0">
               <a:spAutoFit/>
             </a:bodyPr>
+            <a:lstStyle/>
             <a:p>
               <a:r>
                 <a:rPr lang="en-US" sz="1200">
@@ -5179,12 +5466,6 @@
                 </a:rPr>
                 <a:t>XYZ 3D Scanner</a:t>
               </a:r>
-              <a:endParaRPr lang="en-US" sz="1200">
-                <a:solidFill>
-                  <a:schemeClr val="bg1"/>
-                </a:solidFill>
-                <a:latin typeface="Corbel" panose="020B0503020204020204" pitchFamily="34" charset="0"/>
-              </a:endParaRPr>
             </a:p>
           </p:txBody>
         </p:sp>
@@ -5208,6 +5489,7 @@
             <a:bodyPr wrap="none" rtlCol="0">
               <a:spAutoFit/>
             </a:bodyPr>
+            <a:lstStyle/>
             <a:p>
               <a:r>
                 <a:rPr lang="en-US" sz="1200">
@@ -5218,12 +5500,6 @@
                 </a:rPr>
                 <a:t>Bevel Scanner</a:t>
               </a:r>
-              <a:endParaRPr lang="en-US" sz="1200">
-                <a:solidFill>
-                  <a:schemeClr val="bg1"/>
-                </a:solidFill>
-                <a:latin typeface="Corbel" panose="020B0503020204020204" pitchFamily="34" charset="0"/>
-              </a:endParaRPr>
             </a:p>
           </p:txBody>
         </p:sp>
@@ -5247,6 +5523,7 @@
             <a:bodyPr wrap="none" rtlCol="0">
               <a:spAutoFit/>
             </a:bodyPr>
+            <a:lstStyle/>
             <a:p>
               <a:r>
                 <a:rPr lang="en-US" sz="1200">
@@ -5257,12 +5534,6 @@
                 </a:rPr>
                 <a:t>Project Tango</a:t>
               </a:r>
-              <a:endParaRPr lang="en-US" sz="1200">
-                <a:solidFill>
-                  <a:schemeClr val="bg1"/>
-                </a:solidFill>
-                <a:latin typeface="Corbel" panose="020B0503020204020204" pitchFamily="34" charset="0"/>
-              </a:endParaRPr>
             </a:p>
           </p:txBody>
         </p:sp>
@@ -5286,6 +5557,7 @@
             <a:bodyPr wrap="none" rtlCol="0">
               <a:spAutoFit/>
             </a:bodyPr>
+            <a:lstStyle/>
             <a:p>
               <a:r>
                 <a:rPr lang="en-US" sz="1200">
@@ -5296,12 +5568,6 @@
                 </a:rPr>
                 <a:t>iPhone</a:t>
               </a:r>
-              <a:endParaRPr lang="en-US" sz="1200">
-                <a:solidFill>
-                  <a:schemeClr val="bg1"/>
-                </a:solidFill>
-                <a:latin typeface="Corbel" panose="020B0503020204020204" pitchFamily="34" charset="0"/>
-              </a:endParaRPr>
             </a:p>
           </p:txBody>
         </p:sp>
@@ -5314,7 +5580,7 @@
 </p:sld>
 </file>
 
-<file path=ppt/slides/slide3.xml><?xml version="1.0" encoding="utf-8"?>
+<file path=ppt/slides/slide4.xml><?xml version="1.0" encoding="utf-8"?>
 <p:sld xmlns:a="http://schemas.openxmlformats.org/drawingml/2006/main" xmlns:r="http://schemas.openxmlformats.org/officeDocument/2006/relationships" xmlns:p="http://schemas.openxmlformats.org/presentationml/2006/main">
   <p:cSld>
     <p:spTree>
@@ -5323,10 +5589,17 @@
         <p:cNvGrpSpPr/>
         <p:nvPr/>
       </p:nvGrpSpPr>
-      <p:grpSpPr/>
-      <p:sp>
-        <p:nvSpPr>
-          <p:cNvPr id="59" name="Rectangle 58"/>
+      <p:grpSpPr>
+        <a:xfrm>
+          <a:off x="0" y="0"/>
+          <a:ext cx="0" cy="0"/>
+          <a:chOff x="0" y="0"/>
+          <a:chExt cx="0" cy="0"/>
+        </a:xfrm>
+      </p:grpSpPr>
+      <p:sp>
+        <p:nvSpPr>
+          <p:cNvPr id="2" name="Rectangle 1"/>
           <p:cNvSpPr/>
           <p:nvPr/>
         </p:nvSpPr>
@@ -5341,13 +5614,13 @@
         </p:spPr>
         <p:style>
           <a:lnRef idx="1">
-            <a:schemeClr val="accent1"/>
+            <a:schemeClr val="accent3"/>
           </a:lnRef>
           <a:fillRef idx="3">
-            <a:schemeClr val="accent1"/>
+            <a:schemeClr val="accent3"/>
           </a:fillRef>
           <a:effectRef idx="2">
-            <a:schemeClr val="accent1"/>
+            <a:schemeClr val="accent3"/>
           </a:effectRef>
           <a:fontRef idx="minor">
             <a:schemeClr val="lt1"/>
@@ -5355,20 +5628,1804 @@
         </p:style>
         <p:txBody>
           <a:bodyPr rtlCol="0" anchor="ctr"/>
+          <a:lstStyle/>
           <a:p>
             <a:r>
               <a:rPr lang="en-US" dirty="0">
+                <a:effectLst>
+                  <a:outerShdw blurRad="38100" dist="38100" dir="2700000" algn="tl">
+                    <a:srgbClr val="000000">
+                      <a:alpha val="43137"/>
+                    </a:srgbClr>
+                  </a:outerShdw>
+                </a:effectLst>
+                <a:latin typeface="Tempus Sans ITC" panose="04020404030D07020202" pitchFamily="82" charset="0"/>
+              </a:rPr>
+              <a:t>3D </a:t>
+            </a:r>
+            <a:r>
+              <a:rPr lang="en-US" dirty="0" smtClean="0">
+                <a:effectLst>
+                  <a:outerShdw blurRad="38100" dist="38100" dir="2700000" algn="tl">
+                    <a:srgbClr val="000000">
+                      <a:alpha val="43137"/>
+                    </a:srgbClr>
+                  </a:outerShdw>
+                </a:effectLst>
+                <a:latin typeface="Tempus Sans ITC" panose="04020404030D07020202" pitchFamily="82" charset="0"/>
+              </a:rPr>
+              <a:t>PRINTING </a:t>
+            </a:r>
+            <a:r>
+              <a:rPr lang="en-US" dirty="0" smtClean="0">
+                <a:effectLst>
+                  <a:outerShdw blurRad="38100" dist="38100" dir="2700000" algn="tl">
+                    <a:srgbClr val="000000">
+                      <a:alpha val="43137"/>
+                    </a:srgbClr>
+                  </a:outerShdw>
+                </a:effectLst>
+                <a:latin typeface="Tempus Sans ITC" panose="04020404030D07020202" pitchFamily="82" charset="0"/>
+              </a:rPr>
+              <a:t>BECOMES EASY</a:t>
+            </a:r>
+            <a:endParaRPr lang="en-US" dirty="0">
+              <a:effectLst>
+                <a:outerShdw blurRad="38100" dist="38100" dir="2700000" algn="tl">
+                  <a:srgbClr val="000000">
+                    <a:alpha val="43137"/>
+                  </a:srgbClr>
+                </a:outerShdw>
+              </a:effectLst>
+              <a:latin typeface="Tempus Sans ITC" panose="04020404030D07020202" pitchFamily="82" charset="0"/>
+            </a:endParaRPr>
+          </a:p>
+        </p:txBody>
+      </p:sp>
+      <p:grpSp>
+        <p:nvGrpSpPr>
+          <p:cNvPr id="41" name="Group 40"/>
+          <p:cNvGrpSpPr/>
+          <p:nvPr/>
+        </p:nvGrpSpPr>
+        <p:grpSpPr>
+          <a:xfrm>
+            <a:off x="1673952" y="1143000"/>
+            <a:ext cx="2745648" cy="4648200"/>
+            <a:chOff x="513083" y="1143000"/>
+            <a:chExt cx="2745648" cy="4648200"/>
+          </a:xfrm>
+        </p:grpSpPr>
+        <p:pic>
+          <p:nvPicPr>
+            <p:cNvPr id="3" name="Picture 2"/>
+            <p:cNvPicPr>
+              <a:picLocks noChangeAspect="1"/>
+            </p:cNvPicPr>
+            <p:nvPr/>
+          </p:nvPicPr>
+          <p:blipFill>
+            <a:blip r:embed="rId2" cstate="print">
+              <a:extLst>
+                <a:ext uri="{28A0092B-C50C-407E-A947-70E740481C1C}">
+                  <a14:useLocalDpi xmlns:a14="http://schemas.microsoft.com/office/drawing/2010/main" val="0"/>
+                </a:ext>
+              </a:extLst>
+            </a:blip>
+            <a:stretch>
+              <a:fillRect/>
+            </a:stretch>
+          </p:blipFill>
+          <p:spPr>
+            <a:xfrm>
+              <a:off x="513083" y="2515430"/>
+              <a:ext cx="947362" cy="1276793"/>
+            </a:xfrm>
+            <a:prstGeom prst="rect">
+              <a:avLst/>
+            </a:prstGeom>
+          </p:spPr>
+        </p:pic>
+        <p:sp>
+          <p:nvSpPr>
+            <p:cNvPr id="4" name="TextBox 3"/>
+            <p:cNvSpPr txBox="1"/>
+            <p:nvPr/>
+          </p:nvSpPr>
+          <p:spPr>
+            <a:xfrm>
+              <a:off x="1600200" y="3015327"/>
+              <a:ext cx="1545616" cy="276999"/>
+            </a:xfrm>
+            <a:prstGeom prst="rect">
+              <a:avLst/>
+            </a:prstGeom>
+            <a:noFill/>
+          </p:spPr>
+          <p:txBody>
+            <a:bodyPr wrap="none" rtlCol="0">
+              <a:spAutoFit/>
+            </a:bodyPr>
+            <a:lstStyle>
+              <a:defPPr>
+                <a:defRPr lang="en-US"/>
+              </a:defPPr>
+              <a:lvl1pPr>
+                <a:defRPr sz="1200">
+                  <a:solidFill>
+                    <a:schemeClr val="bg1"/>
+                  </a:solidFill>
+                  <a:latin typeface="Corbel" panose="020B0503020204020204" pitchFamily="34" charset="0"/>
+                </a:defRPr>
+              </a:lvl1pPr>
+            </a:lstStyle>
+            <a:p>
+              <a:r>
+                <a:rPr lang="en-US" dirty="0"/>
+                <a:t>Original </a:t>
+              </a:r>
+              <a:r>
+                <a:rPr lang="en-US" dirty="0" err="1"/>
+                <a:t>Prusa</a:t>
+              </a:r>
+              <a:r>
+                <a:rPr lang="en-US" dirty="0"/>
+                <a:t> i3 </a:t>
+              </a:r>
+              <a:r>
+                <a:rPr lang="en-US" dirty="0"/>
+                <a:t>MK2</a:t>
+              </a:r>
+            </a:p>
+          </p:txBody>
+        </p:sp>
+        <p:pic>
+          <p:nvPicPr>
+            <p:cNvPr id="15" name="Picture 14"/>
+            <p:cNvPicPr>
+              <a:picLocks noChangeAspect="1"/>
+            </p:cNvPicPr>
+            <p:nvPr/>
+          </p:nvPicPr>
+          <p:blipFill>
+            <a:blip r:embed="rId3" cstate="print">
+              <a:extLst>
+                <a:ext uri="{28A0092B-C50C-407E-A947-70E740481C1C}">
+                  <a14:useLocalDpi xmlns:a14="http://schemas.microsoft.com/office/drawing/2010/main" val="0"/>
+                </a:ext>
+              </a:extLst>
+            </a:blip>
+            <a:stretch>
+              <a:fillRect/>
+            </a:stretch>
+          </p:blipFill>
+          <p:spPr>
+            <a:xfrm>
+              <a:off x="513083" y="1143000"/>
+              <a:ext cx="947362" cy="1219200"/>
+            </a:xfrm>
+            <a:prstGeom prst="rect">
+              <a:avLst/>
+            </a:prstGeom>
+          </p:spPr>
+        </p:pic>
+        <p:sp>
+          <p:nvSpPr>
+            <p:cNvPr id="16" name="TextBox 15"/>
+            <p:cNvSpPr txBox="1"/>
+            <p:nvPr/>
+          </p:nvSpPr>
+          <p:spPr>
+            <a:xfrm>
+              <a:off x="1600200" y="1614101"/>
+              <a:ext cx="1658531" cy="276999"/>
+            </a:xfrm>
+            <a:prstGeom prst="rect">
+              <a:avLst/>
+            </a:prstGeom>
+            <a:noFill/>
+          </p:spPr>
+          <p:txBody>
+            <a:bodyPr wrap="none" rtlCol="0">
+              <a:spAutoFit/>
+            </a:bodyPr>
+            <a:lstStyle>
+              <a:defPPr>
+                <a:defRPr lang="en-US"/>
+              </a:defPPr>
+              <a:lvl1pPr>
+                <a:defRPr sz="1200">
+                  <a:solidFill>
+                    <a:schemeClr val="bg1"/>
+                  </a:solidFill>
+                  <a:latin typeface="Corbel" panose="020B0503020204020204" pitchFamily="34" charset="0"/>
+                </a:defRPr>
+              </a:lvl1pPr>
+            </a:lstStyle>
+            <a:p>
+              <a:r>
+                <a:rPr lang="en-US" dirty="0" err="1"/>
+                <a:t>Ultimaker</a:t>
+              </a:r>
+              <a:r>
+                <a:rPr lang="en-US" dirty="0"/>
+                <a:t> </a:t>
+              </a:r>
+              <a:r>
+                <a:rPr lang="en-US" dirty="0" err="1"/>
+                <a:t>Ultimaker</a:t>
+              </a:r>
+              <a:r>
+                <a:rPr lang="en-US" dirty="0"/>
+                <a:t> </a:t>
+              </a:r>
+              <a:r>
+                <a:rPr lang="en-US" dirty="0"/>
+                <a:t>2</a:t>
+              </a:r>
+              <a:r>
+                <a:rPr lang="en-US" dirty="0"/>
+                <a:t>+</a:t>
+              </a:r>
+            </a:p>
+          </p:txBody>
+        </p:sp>
+        <p:sp>
+          <p:nvSpPr>
+            <p:cNvPr id="20" name="TextBox 19"/>
+            <p:cNvSpPr txBox="1"/>
+            <p:nvPr/>
+          </p:nvSpPr>
+          <p:spPr>
+            <a:xfrm>
+              <a:off x="1600200" y="4266475"/>
+              <a:ext cx="1117614" cy="276999"/>
+            </a:xfrm>
+            <a:prstGeom prst="rect">
+              <a:avLst/>
+            </a:prstGeom>
+            <a:noFill/>
+          </p:spPr>
+          <p:txBody>
+            <a:bodyPr wrap="none" rtlCol="0">
+              <a:spAutoFit/>
+            </a:bodyPr>
+            <a:lstStyle>
+              <a:defPPr>
+                <a:defRPr lang="en-US"/>
+              </a:defPPr>
+              <a:lvl1pPr>
+                <a:defRPr sz="1200">
+                  <a:solidFill>
+                    <a:schemeClr val="bg1"/>
+                  </a:solidFill>
+                  <a:latin typeface="Corbel" panose="020B0503020204020204" pitchFamily="34" charset="0"/>
+                </a:defRPr>
+              </a:lvl1pPr>
+            </a:lstStyle>
+            <a:p>
+              <a:r>
+                <a:rPr lang="en-US" dirty="0" err="1"/>
+                <a:t>CraftBot</a:t>
+              </a:r>
+              <a:r>
+                <a:rPr lang="en-US" dirty="0"/>
+                <a:t> PLUS</a:t>
+              </a:r>
+            </a:p>
+          </p:txBody>
+        </p:sp>
+        <p:pic>
+          <p:nvPicPr>
+            <p:cNvPr id="21" name="Picture 20"/>
+            <p:cNvPicPr>
+              <a:picLocks noChangeAspect="1"/>
+            </p:cNvPicPr>
+            <p:nvPr/>
+          </p:nvPicPr>
+          <p:blipFill>
+            <a:blip r:embed="rId4" cstate="print">
+              <a:extLst>
+                <a:ext uri="{28A0092B-C50C-407E-A947-70E740481C1C}">
+                  <a14:useLocalDpi xmlns:a14="http://schemas.microsoft.com/office/drawing/2010/main" val="0"/>
+                </a:ext>
+              </a:extLst>
+            </a:blip>
+            <a:stretch>
+              <a:fillRect/>
+            </a:stretch>
+          </p:blipFill>
+          <p:spPr>
+            <a:xfrm>
+              <a:off x="513083" y="5017726"/>
+              <a:ext cx="947361" cy="773474"/>
+            </a:xfrm>
+            <a:prstGeom prst="rect">
+              <a:avLst/>
+            </a:prstGeom>
+          </p:spPr>
+        </p:pic>
+        <p:sp>
+          <p:nvSpPr>
+            <p:cNvPr id="22" name="TextBox 21"/>
+            <p:cNvSpPr txBox="1"/>
+            <p:nvPr/>
+          </p:nvSpPr>
+          <p:spPr>
+            <a:xfrm>
+              <a:off x="1600200" y="5265964"/>
+              <a:ext cx="1069973" cy="276999"/>
+            </a:xfrm>
+            <a:prstGeom prst="rect">
+              <a:avLst/>
+            </a:prstGeom>
+            <a:noFill/>
+          </p:spPr>
+          <p:txBody>
+            <a:bodyPr wrap="none" rtlCol="0">
+              <a:spAutoFit/>
+            </a:bodyPr>
+            <a:lstStyle>
+              <a:defPPr>
+                <a:defRPr lang="en-US"/>
+              </a:defPPr>
+              <a:lvl1pPr>
+                <a:defRPr>
+                  <a:solidFill>
+                    <a:schemeClr val="bg1"/>
+                  </a:solidFill>
+                  <a:latin typeface="Corbel" panose="020B0503020204020204" pitchFamily="34" charset="0"/>
+                </a:defRPr>
+              </a:lvl1pPr>
+            </a:lstStyle>
+            <a:p>
+              <a:r>
+                <a:rPr lang="en-US" sz="1200" dirty="0" err="1"/>
+                <a:t>LulzBot</a:t>
+              </a:r>
+              <a:r>
+                <a:rPr lang="en-US" sz="1200" dirty="0"/>
+                <a:t> TAZ 6</a:t>
+              </a:r>
+            </a:p>
+          </p:txBody>
+        </p:sp>
+        <p:pic>
+          <p:nvPicPr>
+            <p:cNvPr id="38" name="Picture 37"/>
+            <p:cNvPicPr>
+              <a:picLocks noChangeAspect="1"/>
+            </p:cNvPicPr>
+            <p:nvPr/>
+          </p:nvPicPr>
+          <p:blipFill>
+            <a:blip r:embed="rId5" cstate="print">
+              <a:extLst>
+                <a:ext uri="{28A0092B-C50C-407E-A947-70E740481C1C}">
+                  <a14:useLocalDpi xmlns:a14="http://schemas.microsoft.com/office/drawing/2010/main" val="0"/>
+                </a:ext>
+              </a:extLst>
+            </a:blip>
+            <a:stretch>
+              <a:fillRect/>
+            </a:stretch>
+          </p:blipFill>
+          <p:spPr>
+            <a:xfrm>
+              <a:off x="513083" y="3945453"/>
+              <a:ext cx="947361" cy="919042"/>
+            </a:xfrm>
+            <a:prstGeom prst="rect">
+              <a:avLst/>
+            </a:prstGeom>
+          </p:spPr>
+        </p:pic>
+      </p:grpSp>
+      <p:grpSp>
+        <p:nvGrpSpPr>
+          <p:cNvPr id="42" name="Group 41"/>
+          <p:cNvGrpSpPr/>
+          <p:nvPr/>
+        </p:nvGrpSpPr>
+        <p:grpSpPr>
+          <a:xfrm>
+            <a:off x="4671142" y="1219200"/>
+            <a:ext cx="2948858" cy="4648823"/>
+            <a:chOff x="4089736" y="1219200"/>
+            <a:chExt cx="2948858" cy="4648823"/>
+          </a:xfrm>
+        </p:grpSpPr>
+        <p:pic>
+          <p:nvPicPr>
+            <p:cNvPr id="23" name="Picture 22"/>
+            <p:cNvPicPr>
+              <a:picLocks noChangeAspect="1"/>
+            </p:cNvPicPr>
+            <p:nvPr/>
+          </p:nvPicPr>
+          <p:blipFill>
+            <a:blip r:embed="rId6" cstate="print">
+              <a:extLst>
+                <a:ext uri="{28A0092B-C50C-407E-A947-70E740481C1C}">
+                  <a14:useLocalDpi xmlns:a14="http://schemas.microsoft.com/office/drawing/2010/main" val="0"/>
+                </a:ext>
+              </a:extLst>
+            </a:blip>
+            <a:stretch>
+              <a:fillRect/>
+            </a:stretch>
+          </p:blipFill>
+          <p:spPr>
+            <a:xfrm>
+              <a:off x="4089736" y="1219200"/>
+              <a:ext cx="1068507" cy="1068507"/>
+            </a:xfrm>
+            <a:prstGeom prst="rect">
+              <a:avLst/>
+            </a:prstGeom>
+          </p:spPr>
+        </p:pic>
+        <p:sp>
+          <p:nvSpPr>
+            <p:cNvPr id="24" name="TextBox 23"/>
+            <p:cNvSpPr txBox="1"/>
+            <p:nvPr/>
+          </p:nvSpPr>
+          <p:spPr>
+            <a:xfrm>
+              <a:off x="5410200" y="1614954"/>
+              <a:ext cx="875753" cy="276999"/>
+            </a:xfrm>
+            <a:prstGeom prst="rect">
+              <a:avLst/>
+            </a:prstGeom>
+            <a:noFill/>
+          </p:spPr>
+          <p:txBody>
+            <a:bodyPr wrap="none" rtlCol="0">
+              <a:spAutoFit/>
+            </a:bodyPr>
+            <a:lstStyle>
+              <a:defPPr>
+                <a:defRPr lang="en-US"/>
+              </a:defPPr>
+              <a:lvl1pPr>
+                <a:defRPr>
+                  <a:solidFill>
+                    <a:schemeClr val="bg1"/>
+                  </a:solidFill>
+                  <a:latin typeface="Corbel" panose="020B0503020204020204" pitchFamily="34" charset="0"/>
+                </a:defRPr>
+              </a:lvl1pPr>
+            </a:lstStyle>
+            <a:p>
+              <a:r>
+                <a:rPr lang="en-US" sz="1200" dirty="0"/>
+                <a:t>CEL </a:t>
+              </a:r>
+              <a:r>
+                <a:rPr lang="en-US" sz="1200" dirty="0" err="1" smtClean="0"/>
+                <a:t>Robox</a:t>
+              </a:r>
+              <a:endParaRPr lang="en-US" sz="1200" dirty="0"/>
+            </a:p>
+          </p:txBody>
+        </p:sp>
+        <p:pic>
+          <p:nvPicPr>
+            <p:cNvPr id="25" name="Picture 24"/>
+            <p:cNvPicPr>
+              <a:picLocks noChangeAspect="1"/>
+            </p:cNvPicPr>
+            <p:nvPr/>
+          </p:nvPicPr>
+          <p:blipFill>
+            <a:blip r:embed="rId7">
+              <a:extLst>
+                <a:ext uri="{28A0092B-C50C-407E-A947-70E740481C1C}">
+                  <a14:useLocalDpi xmlns:a14="http://schemas.microsoft.com/office/drawing/2010/main" val="0"/>
+                </a:ext>
+              </a:extLst>
+            </a:blip>
+            <a:stretch>
+              <a:fillRect/>
+            </a:stretch>
+          </p:blipFill>
+          <p:spPr>
+            <a:xfrm>
+              <a:off x="4089736" y="2409189"/>
+              <a:ext cx="1068507" cy="1416026"/>
+            </a:xfrm>
+            <a:prstGeom prst="rect">
+              <a:avLst/>
+            </a:prstGeom>
+          </p:spPr>
+        </p:pic>
+        <p:sp>
+          <p:nvSpPr>
+            <p:cNvPr id="26" name="TextBox 25"/>
+            <p:cNvSpPr txBox="1"/>
+            <p:nvPr/>
+          </p:nvSpPr>
+          <p:spPr>
+            <a:xfrm>
+              <a:off x="5410200" y="2978703"/>
+              <a:ext cx="1047274" cy="276999"/>
+            </a:xfrm>
+            <a:prstGeom prst="rect">
+              <a:avLst/>
+            </a:prstGeom>
+            <a:noFill/>
+          </p:spPr>
+          <p:txBody>
+            <a:bodyPr wrap="none" rtlCol="0">
+              <a:spAutoFit/>
+            </a:bodyPr>
+            <a:lstStyle>
+              <a:defPPr>
+                <a:defRPr lang="en-US"/>
+              </a:defPPr>
+              <a:lvl1pPr>
+                <a:defRPr>
+                  <a:solidFill>
+                    <a:schemeClr val="bg1"/>
+                  </a:solidFill>
+                  <a:latin typeface="Corbel" panose="020B0503020204020204" pitchFamily="34" charset="0"/>
+                </a:defRPr>
+              </a:lvl1pPr>
+            </a:lstStyle>
+            <a:p>
+              <a:r>
+                <a:rPr lang="en-US" sz="1200" dirty="0" err="1"/>
+                <a:t>Zortrax</a:t>
+              </a:r>
+              <a:r>
+                <a:rPr lang="en-US" sz="1200" dirty="0"/>
+                <a:t> </a:t>
+              </a:r>
+              <a:r>
+                <a:rPr lang="en-US" sz="1200" dirty="0" smtClean="0"/>
+                <a:t>M200</a:t>
+              </a:r>
+              <a:endParaRPr lang="en-US" sz="1200" dirty="0"/>
+            </a:p>
+          </p:txBody>
+        </p:sp>
+        <p:pic>
+          <p:nvPicPr>
+            <p:cNvPr id="34" name="Picture 33"/>
+            <p:cNvPicPr>
+              <a:picLocks noChangeAspect="1"/>
+            </p:cNvPicPr>
+            <p:nvPr/>
+          </p:nvPicPr>
+          <p:blipFill>
+            <a:blip r:embed="rId8" cstate="print">
+              <a:extLst>
+                <a:ext uri="{28A0092B-C50C-407E-A947-70E740481C1C}">
+                  <a14:useLocalDpi xmlns:a14="http://schemas.microsoft.com/office/drawing/2010/main" val="0"/>
+                </a:ext>
+              </a:extLst>
+            </a:blip>
+            <a:stretch>
+              <a:fillRect/>
+            </a:stretch>
+          </p:blipFill>
+          <p:spPr>
+            <a:xfrm>
+              <a:off x="4089736" y="5028363"/>
+              <a:ext cx="1058151" cy="839660"/>
+            </a:xfrm>
+            <a:prstGeom prst="rect">
+              <a:avLst/>
+            </a:prstGeom>
+          </p:spPr>
+        </p:pic>
+        <p:sp>
+          <p:nvSpPr>
+            <p:cNvPr id="35" name="TextBox 34"/>
+            <p:cNvSpPr txBox="1"/>
+            <p:nvPr/>
+          </p:nvSpPr>
+          <p:spPr>
+            <a:xfrm>
+              <a:off x="5410200" y="5309694"/>
+              <a:ext cx="1355436" cy="276999"/>
+            </a:xfrm>
+            <a:prstGeom prst="rect">
+              <a:avLst/>
+            </a:prstGeom>
+            <a:noFill/>
+          </p:spPr>
+          <p:txBody>
+            <a:bodyPr wrap="none" rtlCol="0">
+              <a:spAutoFit/>
+            </a:bodyPr>
+            <a:lstStyle>
+              <a:defPPr>
+                <a:defRPr lang="en-US"/>
+              </a:defPPr>
+              <a:lvl1pPr>
+                <a:defRPr>
+                  <a:solidFill>
+                    <a:schemeClr val="bg1"/>
+                  </a:solidFill>
+                  <a:latin typeface="Corbel" panose="020B0503020204020204" pitchFamily="34" charset="0"/>
+                </a:defRPr>
+              </a:lvl1pPr>
+            </a:lstStyle>
+            <a:p>
+              <a:r>
+                <a:rPr lang="en-US" sz="1200" dirty="0"/>
+                <a:t>Replicator 5th </a:t>
+              </a:r>
+              <a:r>
+                <a:rPr lang="en-US" sz="1200" dirty="0" smtClean="0"/>
+                <a:t>Gen</a:t>
+              </a:r>
+              <a:endParaRPr lang="en-US" sz="1200" dirty="0"/>
+            </a:p>
+          </p:txBody>
+        </p:sp>
+        <p:sp>
+          <p:nvSpPr>
+            <p:cNvPr id="37" name="Rectangle 36"/>
+            <p:cNvSpPr/>
+            <p:nvPr/>
+          </p:nvSpPr>
+          <p:spPr>
+            <a:xfrm>
+              <a:off x="5410200" y="4288290"/>
+              <a:ext cx="1628394" cy="276999"/>
+            </a:xfrm>
+            <a:prstGeom prst="rect">
+              <a:avLst/>
+            </a:prstGeom>
+            <a:noFill/>
+          </p:spPr>
+          <p:txBody>
+            <a:bodyPr wrap="none" rtlCol="0">
+              <a:spAutoFit/>
+            </a:bodyPr>
+            <a:lstStyle/>
+            <a:p>
+              <a:r>
+                <a:rPr lang="en-US" sz="1200" dirty="0" err="1">
+                  <a:solidFill>
+                    <a:schemeClr val="bg1"/>
+                  </a:solidFill>
+                  <a:latin typeface="Corbel" panose="020B0503020204020204" pitchFamily="34" charset="0"/>
+                </a:rPr>
+                <a:t>Printrbot</a:t>
+              </a:r>
+              <a:r>
+                <a:rPr lang="en-US" sz="1200" dirty="0">
+                  <a:solidFill>
+                    <a:schemeClr val="bg1"/>
+                  </a:solidFill>
+                  <a:latin typeface="Corbel" panose="020B0503020204020204" pitchFamily="34" charset="0"/>
+                </a:rPr>
+                <a:t> Simple Metal</a:t>
+              </a:r>
+            </a:p>
+          </p:txBody>
+        </p:sp>
+        <p:pic>
+          <p:nvPicPr>
+            <p:cNvPr id="39" name="Picture 38"/>
+            <p:cNvPicPr>
+              <a:picLocks noChangeAspect="1"/>
+            </p:cNvPicPr>
+            <p:nvPr/>
+          </p:nvPicPr>
+          <p:blipFill>
+            <a:blip r:embed="rId9" cstate="print">
+              <a:extLst>
+                <a:ext uri="{28A0092B-C50C-407E-A947-70E740481C1C}">
+                  <a14:useLocalDpi xmlns:a14="http://schemas.microsoft.com/office/drawing/2010/main" val="0"/>
+                </a:ext>
+              </a:extLst>
+            </a:blip>
+            <a:stretch>
+              <a:fillRect/>
+            </a:stretch>
+          </p:blipFill>
+          <p:spPr>
+            <a:xfrm>
+              <a:off x="4089736" y="3946697"/>
+              <a:ext cx="1058150" cy="960184"/>
+            </a:xfrm>
+            <a:prstGeom prst="rect">
+              <a:avLst/>
+            </a:prstGeom>
+          </p:spPr>
+        </p:pic>
+      </p:grpSp>
+    </p:spTree>
+    <p:extLst>
+      <p:ext uri="{BB962C8B-B14F-4D97-AF65-F5344CB8AC3E}">
+        <p14:creationId xmlns:p14="http://schemas.microsoft.com/office/powerpoint/2010/main" val="2516148395"/>
+      </p:ext>
+    </p:extLst>
+  </p:cSld>
+  <p:clrMapOvr>
+    <a:masterClrMapping/>
+  </p:clrMapOvr>
+</p:sld>
+</file>
+
+<file path=ppt/slides/slide5.xml><?xml version="1.0" encoding="utf-8"?>
+<p:sld xmlns:a="http://schemas.openxmlformats.org/drawingml/2006/main" xmlns:r="http://schemas.openxmlformats.org/officeDocument/2006/relationships" xmlns:p="http://schemas.openxmlformats.org/presentationml/2006/main">
+  <p:cSld>
+    <p:spTree>
+      <p:nvGrpSpPr>
+        <p:cNvPr id="1" name=""/>
+        <p:cNvGrpSpPr/>
+        <p:nvPr/>
+      </p:nvGrpSpPr>
+      <p:grpSpPr>
+        <a:xfrm>
+          <a:off x="0" y="0"/>
+          <a:ext cx="0" cy="0"/>
+          <a:chOff x="0" y="0"/>
+          <a:chExt cx="0" cy="0"/>
+        </a:xfrm>
+      </p:grpSpPr>
+      <p:sp>
+        <p:nvSpPr>
+          <p:cNvPr id="37" name="Rectangle 36"/>
+          <p:cNvSpPr/>
+          <p:nvPr/>
+        </p:nvSpPr>
+        <p:spPr>
+          <a:xfrm>
+            <a:off x="0" y="304800"/>
+            <a:ext cx="9144000" cy="457200"/>
+          </a:xfrm>
+          <a:prstGeom prst="rect">
+            <a:avLst/>
+          </a:prstGeom>
+        </p:spPr>
+        <p:style>
+          <a:lnRef idx="1">
+            <a:schemeClr val="accent3"/>
+          </a:lnRef>
+          <a:fillRef idx="3">
+            <a:schemeClr val="accent3"/>
+          </a:fillRef>
+          <a:effectRef idx="2">
+            <a:schemeClr val="accent3"/>
+          </a:effectRef>
+          <a:fontRef idx="minor">
+            <a:schemeClr val="lt1"/>
+          </a:fontRef>
+        </p:style>
+        <p:txBody>
+          <a:bodyPr rtlCol="0" anchor="ctr"/>
+          <a:lstStyle/>
+          <a:p>
+            <a:r>
+              <a:rPr lang="en-US" dirty="0" smtClean="0">
+                <a:effectLst>
+                  <a:outerShdw blurRad="38100" dist="38100" dir="2700000" algn="tl">
+                    <a:srgbClr val="000000">
+                      <a:alpha val="43137"/>
+                    </a:srgbClr>
+                  </a:outerShdw>
+                </a:effectLst>
+                <a:latin typeface="Tempus Sans ITC" panose="04020404030D07020202" pitchFamily="82" charset="0"/>
+              </a:rPr>
+              <a:t>MODELING IS PAINFULL</a:t>
+            </a:r>
+            <a:endParaRPr lang="en-US" dirty="0">
+              <a:effectLst>
+                <a:outerShdw blurRad="38100" dist="38100" dir="2700000" algn="tl">
+                  <a:srgbClr val="000000">
+                    <a:alpha val="43137"/>
+                  </a:srgbClr>
+                </a:outerShdw>
+              </a:effectLst>
+              <a:latin typeface="Tempus Sans ITC" panose="04020404030D07020202" pitchFamily="82" charset="0"/>
+            </a:endParaRPr>
+          </a:p>
+        </p:txBody>
+      </p:sp>
+      <p:grpSp>
+        <p:nvGrpSpPr>
+          <p:cNvPr id="42" name="Group 41"/>
+          <p:cNvGrpSpPr/>
+          <p:nvPr/>
+        </p:nvGrpSpPr>
+        <p:grpSpPr>
+          <a:xfrm>
+            <a:off x="0" y="1066800"/>
+            <a:ext cx="9144000" cy="5257800"/>
+            <a:chOff x="-1" y="1065320"/>
+            <a:chExt cx="9144001" cy="5792682"/>
+          </a:xfrm>
+        </p:grpSpPr>
+        <p:sp>
+          <p:nvSpPr>
+            <p:cNvPr id="36" name="Rectangle 35"/>
+            <p:cNvSpPr/>
+            <p:nvPr/>
+          </p:nvSpPr>
+          <p:spPr>
+            <a:xfrm>
+              <a:off x="5943600" y="1385659"/>
+              <a:ext cx="3200400" cy="5472341"/>
+            </a:xfrm>
+            <a:prstGeom prst="rect">
+              <a:avLst/>
+            </a:prstGeom>
+            <a:solidFill>
+              <a:schemeClr val="bg1">
+                <a:alpha val="30000"/>
+              </a:schemeClr>
+            </a:solidFill>
+            <a:ln>
+              <a:noFill/>
+            </a:ln>
+          </p:spPr>
+          <p:style>
+            <a:lnRef idx="1">
+              <a:schemeClr val="accent3"/>
+            </a:lnRef>
+            <a:fillRef idx="2">
+              <a:schemeClr val="accent3"/>
+            </a:fillRef>
+            <a:effectRef idx="1">
+              <a:schemeClr val="accent3"/>
+            </a:effectRef>
+            <a:fontRef idx="minor">
+              <a:schemeClr val="dk1"/>
+            </a:fontRef>
+          </p:style>
+          <p:txBody>
+            <a:bodyPr rot="0" spcFirstLastPara="0" vertOverflow="overflow" horzOverflow="overflow" vert="horz" wrap="square" lIns="91440" tIns="45720" rIns="91440" bIns="45720" numCol="1" spcCol="0" rtlCol="0" fromWordArt="0" anchor="t" anchorCtr="0" forceAA="0" compatLnSpc="1">
+              <a:prstTxWarp prst="textNoShape">
+                <a:avLst/>
+              </a:prstTxWarp>
+              <a:noAutofit/>
+            </a:bodyPr>
+            <a:lstStyle/>
+            <a:p>
+              <a:pPr algn="ctr"/>
+              <a:r>
+                <a:rPr lang="en-US" sz="1400" b="1" dirty="0" smtClean="0">
+                  <a:solidFill>
+                    <a:schemeClr val="bg1"/>
+                  </a:solidFill>
+                  <a:effectLst>
+                    <a:outerShdw blurRad="38100" dist="38100" dir="2700000" algn="tl">
+                      <a:srgbClr val="000000">
+                        <a:alpha val="43137"/>
+                      </a:srgbClr>
+                    </a:outerShdw>
+                  </a:effectLst>
+                </a:rPr>
+                <a:t>NURBS</a:t>
+              </a:r>
+              <a:endParaRPr lang="en-US" sz="1400" b="1" dirty="0">
+                <a:solidFill>
+                  <a:schemeClr val="bg1"/>
+                </a:solidFill>
+                <a:effectLst>
+                  <a:outerShdw blurRad="38100" dist="38100" dir="2700000" algn="tl">
+                    <a:srgbClr val="000000">
+                      <a:alpha val="43137"/>
+                    </a:srgbClr>
+                  </a:outerShdw>
+                </a:effectLst>
+              </a:endParaRPr>
+            </a:p>
+          </p:txBody>
+        </p:sp>
+        <p:sp>
+          <p:nvSpPr>
+            <p:cNvPr id="35" name="Rectangle 34"/>
+            <p:cNvSpPr/>
+            <p:nvPr/>
+          </p:nvSpPr>
+          <p:spPr>
+            <a:xfrm>
+              <a:off x="3048000" y="1385659"/>
+              <a:ext cx="2895600" cy="5472341"/>
+            </a:xfrm>
+            <a:prstGeom prst="rect">
+              <a:avLst/>
+            </a:prstGeom>
+            <a:solidFill>
+              <a:schemeClr val="bg1">
+                <a:alpha val="65000"/>
+              </a:schemeClr>
+            </a:solidFill>
+            <a:ln>
+              <a:noFill/>
+            </a:ln>
+          </p:spPr>
+          <p:style>
+            <a:lnRef idx="1">
+              <a:schemeClr val="accent3"/>
+            </a:lnRef>
+            <a:fillRef idx="2">
+              <a:schemeClr val="accent3"/>
+            </a:fillRef>
+            <a:effectRef idx="1">
+              <a:schemeClr val="accent3"/>
+            </a:effectRef>
+            <a:fontRef idx="minor">
+              <a:schemeClr val="dk1"/>
+            </a:fontRef>
+          </p:style>
+          <p:txBody>
+            <a:bodyPr rot="0" spcFirstLastPara="0" vertOverflow="overflow" horzOverflow="overflow" vert="horz" wrap="square" lIns="91440" tIns="45720" rIns="91440" bIns="45720" numCol="1" spcCol="0" rtlCol="0" fromWordArt="0" anchor="t" anchorCtr="0" forceAA="0" compatLnSpc="1">
+              <a:prstTxWarp prst="textNoShape">
+                <a:avLst/>
+              </a:prstTxWarp>
+              <a:noAutofit/>
+            </a:bodyPr>
+            <a:lstStyle/>
+            <a:p>
+              <a:pPr algn="ctr"/>
+              <a:r>
+                <a:rPr lang="en-US" sz="1400" b="1" dirty="0" smtClean="0">
+                  <a:solidFill>
+                    <a:schemeClr val="bg1"/>
+                  </a:solidFill>
+                  <a:effectLst>
+                    <a:outerShdw blurRad="38100" dist="38100" dir="2700000" algn="tl">
+                      <a:srgbClr val="000000">
+                        <a:alpha val="43137"/>
+                      </a:srgbClr>
+                    </a:outerShdw>
+                  </a:effectLst>
+                </a:rPr>
+                <a:t>SUBDIVISION</a:t>
+              </a:r>
+              <a:endParaRPr lang="en-US" sz="1400" b="1" dirty="0">
+                <a:solidFill>
+                  <a:schemeClr val="bg1"/>
+                </a:solidFill>
+                <a:effectLst>
+                  <a:outerShdw blurRad="38100" dist="38100" dir="2700000" algn="tl">
+                    <a:srgbClr val="000000">
+                      <a:alpha val="43137"/>
+                    </a:srgbClr>
+                  </a:outerShdw>
+                </a:effectLst>
+              </a:endParaRPr>
+            </a:p>
+          </p:txBody>
+        </p:sp>
+        <p:sp>
+          <p:nvSpPr>
+            <p:cNvPr id="5" name="Rectangle 4"/>
+            <p:cNvSpPr/>
+            <p:nvPr/>
+          </p:nvSpPr>
+          <p:spPr>
+            <a:xfrm>
+              <a:off x="306280" y="1385659"/>
+              <a:ext cx="2741720" cy="5472341"/>
+            </a:xfrm>
+            <a:prstGeom prst="rect">
+              <a:avLst/>
+            </a:prstGeom>
+            <a:solidFill>
+              <a:schemeClr val="bg1"/>
+            </a:solidFill>
+            <a:ln>
+              <a:noFill/>
+            </a:ln>
+          </p:spPr>
+          <p:style>
+            <a:lnRef idx="1">
+              <a:schemeClr val="accent3"/>
+            </a:lnRef>
+            <a:fillRef idx="2">
+              <a:schemeClr val="accent3"/>
+            </a:fillRef>
+            <a:effectRef idx="1">
+              <a:schemeClr val="accent3"/>
+            </a:effectRef>
+            <a:fontRef idx="minor">
+              <a:schemeClr val="dk1"/>
+            </a:fontRef>
+          </p:style>
+          <p:txBody>
+            <a:bodyPr rot="0" spcFirstLastPara="0" vertOverflow="overflow" horzOverflow="overflow" vert="horz" wrap="square" lIns="91440" tIns="45720" rIns="91440" bIns="45720" numCol="1" spcCol="0" rtlCol="0" fromWordArt="0" anchor="t" anchorCtr="0" forceAA="0" compatLnSpc="1">
+              <a:prstTxWarp prst="textNoShape">
+                <a:avLst/>
+              </a:prstTxWarp>
+              <a:noAutofit/>
+            </a:bodyPr>
+            <a:lstStyle/>
+            <a:p>
+              <a:pPr algn="ctr"/>
+              <a:r>
+                <a:rPr lang="en-US" sz="1400" b="1" dirty="0" smtClean="0">
+                  <a:solidFill>
+                    <a:schemeClr val="bg1"/>
+                  </a:solidFill>
+                  <a:effectLst>
+                    <a:outerShdw blurRad="38100" dist="38100" dir="2700000" algn="tl">
+                      <a:srgbClr val="000000">
+                        <a:alpha val="43137"/>
+                      </a:srgbClr>
+                    </a:outerShdw>
+                  </a:effectLst>
+                </a:rPr>
+                <a:t>MESH</a:t>
+              </a:r>
+            </a:p>
+          </p:txBody>
+        </p:sp>
+        <p:sp>
+          <p:nvSpPr>
+            <p:cNvPr id="38" name="Rectangle 37"/>
+            <p:cNvSpPr/>
+            <p:nvPr/>
+          </p:nvSpPr>
+          <p:spPr>
+            <a:xfrm>
+              <a:off x="306280" y="2576454"/>
+              <a:ext cx="8837720" cy="2218680"/>
+            </a:xfrm>
+            <a:prstGeom prst="rect">
+              <a:avLst/>
+            </a:prstGeom>
+            <a:ln/>
+            <a:effectLst>
+              <a:glow rad="1905000">
+                <a:schemeClr val="accent1">
+                  <a:alpha val="0"/>
+                </a:schemeClr>
+              </a:glow>
+              <a:outerShdw blurRad="40000" dist="20000" dir="5400000" rotWithShape="0">
+                <a:srgbClr val="000000">
+                  <a:alpha val="38000"/>
+                </a:srgbClr>
+              </a:outerShdw>
+              <a:softEdge rad="596900"/>
+            </a:effectLst>
+          </p:spPr>
+          <p:style>
+            <a:lnRef idx="1">
+              <a:schemeClr val="accent3"/>
+            </a:lnRef>
+            <a:fillRef idx="2">
+              <a:schemeClr val="accent3"/>
+            </a:fillRef>
+            <a:effectRef idx="1">
+              <a:schemeClr val="accent3"/>
+            </a:effectRef>
+            <a:fontRef idx="minor">
+              <a:schemeClr val="dk1"/>
+            </a:fontRef>
+          </p:style>
+          <p:txBody>
+            <a:bodyPr rot="0" spcFirstLastPara="0" vertOverflow="overflow" horzOverflow="overflow" vert="horz" wrap="square" lIns="91440" tIns="45720" rIns="91440" bIns="45720" numCol="1" spcCol="0" rtlCol="0" fromWordArt="0" anchor="ctr" anchorCtr="0" forceAA="0" compatLnSpc="1">
+              <a:prstTxWarp prst="textNoShape">
+                <a:avLst/>
+              </a:prstTxWarp>
+              <a:noAutofit/>
+            </a:bodyPr>
+            <a:lstStyle/>
+            <a:p>
+              <a:pPr algn="ctr"/>
+              <a:endParaRPr lang="en-US" sz="1400" dirty="0" smtClean="0"/>
+            </a:p>
+          </p:txBody>
+        </p:sp>
+        <p:sp>
+          <p:nvSpPr>
+            <p:cNvPr id="21" name="Rectangle 20"/>
+            <p:cNvSpPr/>
+            <p:nvPr/>
+          </p:nvSpPr>
+          <p:spPr>
+            <a:xfrm rot="5400000">
+              <a:off x="-2602269" y="3949454"/>
+              <a:ext cx="5510817" cy="306280"/>
+            </a:xfrm>
+            <a:prstGeom prst="rect">
+              <a:avLst/>
+            </a:prstGeom>
+            <a:gradFill flip="none" rotWithShape="1">
+              <a:gsLst>
+                <a:gs pos="0">
+                  <a:schemeClr val="tx1">
+                    <a:lumMod val="95000"/>
+                    <a:lumOff val="5000"/>
+                  </a:schemeClr>
+                </a:gs>
+                <a:gs pos="95000">
+                  <a:schemeClr val="accent5">
+                    <a:shade val="93000"/>
+                    <a:satMod val="130000"/>
+                  </a:schemeClr>
+                </a:gs>
+                <a:gs pos="100000">
+                  <a:schemeClr val="accent5">
+                    <a:shade val="94000"/>
+                    <a:satMod val="135000"/>
+                    <a:lumMod val="50000"/>
+                    <a:lumOff val="50000"/>
+                  </a:schemeClr>
+                </a:gs>
+              </a:gsLst>
+              <a:lin ang="10800000" scaled="1"/>
+              <a:tileRect/>
+            </a:gradFill>
+            <a:ln>
+              <a:noFill/>
+            </a:ln>
+          </p:spPr>
+          <p:style>
+            <a:lnRef idx="1">
+              <a:schemeClr val="accent5"/>
+            </a:lnRef>
+            <a:fillRef idx="3">
+              <a:schemeClr val="accent5"/>
+            </a:fillRef>
+            <a:effectRef idx="2">
+              <a:schemeClr val="accent5"/>
+            </a:effectRef>
+            <a:fontRef idx="minor">
+              <a:schemeClr val="lt1"/>
+            </a:fontRef>
+          </p:style>
+          <p:txBody>
+            <a:bodyPr rtlCol="0" anchor="ctr"/>
+            <a:lstStyle/>
+            <a:p>
+              <a:r>
+                <a:rPr lang="en-US" sz="1600" b="1" dirty="0">
+                  <a:effectLst>
+                    <a:outerShdw blurRad="38100" dist="38100" dir="2700000" algn="tl">
+                      <a:srgbClr val="000000">
+                        <a:alpha val="43137"/>
+                      </a:srgbClr>
+                    </a:outerShdw>
+                  </a:effectLst>
+                  <a:latin typeface="Corbel" panose="020B0503020204020204" pitchFamily="34" charset="0"/>
+                </a:rPr>
+                <a:t>Usability</a:t>
+              </a:r>
+              <a:endParaRPr lang="en-US" sz="1600" b="1" dirty="0">
+                <a:effectLst>
+                  <a:outerShdw blurRad="38100" dist="38100" dir="2700000" algn="tl">
+                    <a:srgbClr val="000000">
+                      <a:alpha val="43137"/>
+                    </a:srgbClr>
+                  </a:outerShdw>
+                </a:effectLst>
                 <a:latin typeface="Corbel" panose="020B0503020204020204" pitchFamily="34" charset="0"/>
+              </a:endParaRPr>
+            </a:p>
+          </p:txBody>
+        </p:sp>
+        <p:pic>
+          <p:nvPicPr>
+            <p:cNvPr id="24" name="Picture 23"/>
+            <p:cNvPicPr>
+              <a:picLocks noChangeAspect="1"/>
+            </p:cNvPicPr>
+            <p:nvPr/>
+          </p:nvPicPr>
+          <p:blipFill>
+            <a:blip r:embed="rId2" cstate="print">
+              <a:extLst>
+                <a:ext uri="{28A0092B-C50C-407E-A947-70E740481C1C}">
+                  <a14:useLocalDpi xmlns:a14="http://schemas.microsoft.com/office/drawing/2010/main" val="0"/>
+                </a:ext>
+              </a:extLst>
+            </a:blip>
+            <a:stretch>
+              <a:fillRect/>
+            </a:stretch>
+          </p:blipFill>
+          <p:spPr>
+            <a:xfrm>
+              <a:off x="3885459" y="4343400"/>
+              <a:ext cx="1371600" cy="930405"/>
+            </a:xfrm>
+            <a:prstGeom prst="rect">
+              <a:avLst/>
+            </a:prstGeom>
+          </p:spPr>
+        </p:pic>
+        <p:pic>
+          <p:nvPicPr>
+            <p:cNvPr id="26" name="Picture 25"/>
+            <p:cNvPicPr>
+              <a:picLocks noChangeAspect="1"/>
+            </p:cNvPicPr>
+            <p:nvPr/>
+          </p:nvPicPr>
+          <p:blipFill>
+            <a:blip r:embed="rId3" cstate="print">
+              <a:extLst>
+                <a:ext uri="{28A0092B-C50C-407E-A947-70E740481C1C}">
+                  <a14:useLocalDpi xmlns:a14="http://schemas.microsoft.com/office/drawing/2010/main" val="0"/>
+                </a:ext>
+              </a:extLst>
+            </a:blip>
+            <a:stretch>
+              <a:fillRect/>
+            </a:stretch>
+          </p:blipFill>
+          <p:spPr>
+            <a:xfrm>
+              <a:off x="7026409" y="5866645"/>
+              <a:ext cx="1371600" cy="991355"/>
+            </a:xfrm>
+            <a:prstGeom prst="rect">
+              <a:avLst/>
+            </a:prstGeom>
+          </p:spPr>
+        </p:pic>
+        <p:pic>
+          <p:nvPicPr>
+            <p:cNvPr id="27" name="Picture 26"/>
+            <p:cNvPicPr>
+              <a:picLocks noChangeAspect="1"/>
+            </p:cNvPicPr>
+            <p:nvPr/>
+          </p:nvPicPr>
+          <p:blipFill>
+            <a:blip r:embed="rId4" cstate="print">
+              <a:extLst>
+                <a:ext uri="{28A0092B-C50C-407E-A947-70E740481C1C}">
+                  <a14:useLocalDpi xmlns:a14="http://schemas.microsoft.com/office/drawing/2010/main" val="0"/>
+                </a:ext>
+              </a:extLst>
+            </a:blip>
+            <a:stretch>
+              <a:fillRect/>
+            </a:stretch>
+          </p:blipFill>
+          <p:spPr>
+            <a:xfrm>
+              <a:off x="550197" y="5767528"/>
+              <a:ext cx="1371600" cy="771525"/>
+            </a:xfrm>
+            <a:prstGeom prst="rect">
+              <a:avLst/>
+            </a:prstGeom>
+          </p:spPr>
+        </p:pic>
+        <p:pic>
+          <p:nvPicPr>
+            <p:cNvPr id="28" name="Picture 27"/>
+            <p:cNvPicPr>
+              <a:picLocks noChangeAspect="1"/>
+            </p:cNvPicPr>
+            <p:nvPr/>
+          </p:nvPicPr>
+          <p:blipFill>
+            <a:blip r:embed="rId5" cstate="print">
+              <a:extLst>
+                <a:ext uri="{28A0092B-C50C-407E-A947-70E740481C1C}">
+                  <a14:useLocalDpi xmlns:a14="http://schemas.microsoft.com/office/drawing/2010/main" val="0"/>
+                </a:ext>
+              </a:extLst>
+            </a:blip>
+            <a:stretch>
+              <a:fillRect/>
+            </a:stretch>
+          </p:blipFill>
+          <p:spPr>
+            <a:xfrm>
+              <a:off x="500412" y="4301618"/>
+              <a:ext cx="1371600" cy="906651"/>
+            </a:xfrm>
+            <a:prstGeom prst="rect">
+              <a:avLst/>
+            </a:prstGeom>
+          </p:spPr>
+        </p:pic>
+        <p:pic>
+          <p:nvPicPr>
+            <p:cNvPr id="30" name="Picture 29"/>
+            <p:cNvPicPr>
+              <a:picLocks noChangeAspect="1"/>
+            </p:cNvPicPr>
+            <p:nvPr/>
+          </p:nvPicPr>
+          <p:blipFill>
+            <a:blip r:embed="rId6" cstate="print">
+              <a:extLst>
+                <a:ext uri="{28A0092B-C50C-407E-A947-70E740481C1C}">
+                  <a14:useLocalDpi xmlns:a14="http://schemas.microsoft.com/office/drawing/2010/main" val="0"/>
+                </a:ext>
+              </a:extLst>
+            </a:blip>
+            <a:stretch>
+              <a:fillRect/>
+            </a:stretch>
+          </p:blipFill>
+          <p:spPr>
+            <a:xfrm>
+              <a:off x="1047868" y="6086475"/>
+              <a:ext cx="1371600" cy="771525"/>
+            </a:xfrm>
+            <a:prstGeom prst="rect">
+              <a:avLst/>
+            </a:prstGeom>
+          </p:spPr>
+        </p:pic>
+        <p:pic>
+          <p:nvPicPr>
+            <p:cNvPr id="31" name="Picture 30"/>
+            <p:cNvPicPr>
+              <a:picLocks noChangeAspect="1"/>
+            </p:cNvPicPr>
+            <p:nvPr/>
+          </p:nvPicPr>
+          <p:blipFill>
+            <a:blip r:embed="rId7" cstate="print">
+              <a:extLst>
+                <a:ext uri="{28A0092B-C50C-407E-A947-70E740481C1C}">
+                  <a14:useLocalDpi xmlns:a14="http://schemas.microsoft.com/office/drawing/2010/main" val="0"/>
+                </a:ext>
+              </a:extLst>
+            </a:blip>
+            <a:stretch>
+              <a:fillRect/>
+            </a:stretch>
+          </p:blipFill>
+          <p:spPr>
+            <a:xfrm>
+              <a:off x="7026409" y="3343275"/>
+              <a:ext cx="1371600" cy="771525"/>
+            </a:xfrm>
+            <a:prstGeom prst="rect">
+              <a:avLst/>
+            </a:prstGeom>
+          </p:spPr>
+        </p:pic>
+        <p:pic>
+          <p:nvPicPr>
+            <p:cNvPr id="32" name="Picture 31"/>
+            <p:cNvPicPr>
+              <a:picLocks noChangeAspect="1"/>
+            </p:cNvPicPr>
+            <p:nvPr/>
+          </p:nvPicPr>
+          <p:blipFill>
+            <a:blip r:embed="rId8" cstate="print">
+              <a:extLst>
+                <a:ext uri="{28A0092B-C50C-407E-A947-70E740481C1C}">
+                  <a14:useLocalDpi xmlns:a14="http://schemas.microsoft.com/office/drawing/2010/main" val="0"/>
+                </a:ext>
+              </a:extLst>
+            </a:blip>
+            <a:stretch>
+              <a:fillRect/>
+            </a:stretch>
+          </p:blipFill>
+          <p:spPr>
+            <a:xfrm>
+              <a:off x="7026409" y="1929972"/>
+              <a:ext cx="1371600" cy="889428"/>
+            </a:xfrm>
+            <a:prstGeom prst="rect">
+              <a:avLst/>
+            </a:prstGeom>
+          </p:spPr>
+        </p:pic>
+        <p:pic>
+          <p:nvPicPr>
+            <p:cNvPr id="33" name="Picture 32"/>
+            <p:cNvPicPr>
+              <a:picLocks noChangeAspect="1"/>
+            </p:cNvPicPr>
+            <p:nvPr/>
+          </p:nvPicPr>
+          <p:blipFill>
+            <a:blip r:embed="rId9" cstate="print">
+              <a:extLst>
+                <a:ext uri="{28A0092B-C50C-407E-A947-70E740481C1C}">
+                  <a14:useLocalDpi xmlns:a14="http://schemas.microsoft.com/office/drawing/2010/main" val="0"/>
+                </a:ext>
+              </a:extLst>
+            </a:blip>
+            <a:stretch>
+              <a:fillRect/>
+            </a:stretch>
+          </p:blipFill>
+          <p:spPr>
+            <a:xfrm>
+              <a:off x="762000" y="4601907"/>
+              <a:ext cx="1371600" cy="742236"/>
+            </a:xfrm>
+            <a:prstGeom prst="rect">
+              <a:avLst/>
+            </a:prstGeom>
+          </p:spPr>
+        </p:pic>
+        <p:pic>
+          <p:nvPicPr>
+            <p:cNvPr id="34" name="Picture 33"/>
+            <p:cNvPicPr>
+              <a:picLocks noChangeAspect="1"/>
+            </p:cNvPicPr>
+            <p:nvPr/>
+          </p:nvPicPr>
+          <p:blipFill>
+            <a:blip r:embed="rId10" cstate="print">
+              <a:extLst>
+                <a:ext uri="{28A0092B-C50C-407E-A947-70E740481C1C}">
+                  <a14:useLocalDpi xmlns:a14="http://schemas.microsoft.com/office/drawing/2010/main" val="0"/>
+                </a:ext>
+              </a:extLst>
+            </a:blip>
+            <a:stretch>
+              <a:fillRect/>
+            </a:stretch>
+          </p:blipFill>
+          <p:spPr>
+            <a:xfrm>
+              <a:off x="3886199" y="3361944"/>
+              <a:ext cx="1371600" cy="752856"/>
+            </a:xfrm>
+            <a:prstGeom prst="rect">
+              <a:avLst/>
+            </a:prstGeom>
+          </p:spPr>
+        </p:pic>
+        <p:pic>
+          <p:nvPicPr>
+            <p:cNvPr id="23" name="Picture 22"/>
+            <p:cNvPicPr>
+              <a:picLocks noChangeAspect="1"/>
+            </p:cNvPicPr>
+            <p:nvPr/>
+          </p:nvPicPr>
+          <p:blipFill>
+            <a:blip r:embed="rId11" cstate="print">
+              <a:extLst>
+                <a:ext uri="{28A0092B-C50C-407E-A947-70E740481C1C}">
+                  <a14:useLocalDpi xmlns:a14="http://schemas.microsoft.com/office/drawing/2010/main" val="0"/>
+                </a:ext>
+              </a:extLst>
+            </a:blip>
+            <a:stretch>
+              <a:fillRect/>
+            </a:stretch>
+          </p:blipFill>
+          <p:spPr>
+            <a:xfrm>
+              <a:off x="3885459" y="6086475"/>
+              <a:ext cx="1371600" cy="771525"/>
+            </a:xfrm>
+            <a:prstGeom prst="rect">
+              <a:avLst/>
+            </a:prstGeom>
+          </p:spPr>
+        </p:pic>
+        <p:pic>
+          <p:nvPicPr>
+            <p:cNvPr id="29" name="Picture 28"/>
+            <p:cNvPicPr>
+              <a:picLocks noChangeAspect="1"/>
+            </p:cNvPicPr>
+            <p:nvPr/>
+          </p:nvPicPr>
+          <p:blipFill>
+            <a:blip r:embed="rId12" cstate="print">
+              <a:extLst>
+                <a:ext uri="{28A0092B-C50C-407E-A947-70E740481C1C}">
+                  <a14:useLocalDpi xmlns:a14="http://schemas.microsoft.com/office/drawing/2010/main" val="0"/>
+                </a:ext>
+              </a:extLst>
+            </a:blip>
+            <a:stretch>
+              <a:fillRect/>
+            </a:stretch>
+          </p:blipFill>
+          <p:spPr>
+            <a:xfrm>
+              <a:off x="1066800" y="4879086"/>
+              <a:ext cx="1371600" cy="912114"/>
+            </a:xfrm>
+            <a:prstGeom prst="rect">
+              <a:avLst/>
+            </a:prstGeom>
+          </p:spPr>
+        </p:pic>
+        <p:sp>
+          <p:nvSpPr>
+            <p:cNvPr id="19" name="Rectangle 18"/>
+            <p:cNvSpPr/>
+            <p:nvPr/>
+          </p:nvSpPr>
+          <p:spPr>
+            <a:xfrm>
+              <a:off x="-1" y="1065320"/>
+              <a:ext cx="9144001" cy="306280"/>
+            </a:xfrm>
+            <a:prstGeom prst="rect">
+              <a:avLst/>
+            </a:prstGeom>
+            <a:gradFill flip="none" rotWithShape="1">
+              <a:gsLst>
+                <a:gs pos="0">
+                  <a:schemeClr val="tx1">
+                    <a:lumMod val="95000"/>
+                    <a:lumOff val="5000"/>
+                  </a:schemeClr>
+                </a:gs>
+                <a:gs pos="95000">
+                  <a:schemeClr val="accent5">
+                    <a:shade val="93000"/>
+                    <a:satMod val="130000"/>
+                  </a:schemeClr>
+                </a:gs>
+                <a:gs pos="100000">
+                  <a:schemeClr val="accent5">
+                    <a:shade val="94000"/>
+                    <a:satMod val="135000"/>
+                    <a:lumMod val="50000"/>
+                    <a:lumOff val="50000"/>
+                  </a:schemeClr>
+                </a:gs>
+              </a:gsLst>
+              <a:lin ang="10800000" scaled="1"/>
+              <a:tileRect/>
+            </a:gradFill>
+            <a:ln>
+              <a:noFill/>
+            </a:ln>
+          </p:spPr>
+          <p:style>
+            <a:lnRef idx="1">
+              <a:schemeClr val="accent5"/>
+            </a:lnRef>
+            <a:fillRef idx="3">
+              <a:schemeClr val="accent5"/>
+            </a:fillRef>
+            <a:effectRef idx="2">
+              <a:schemeClr val="accent5"/>
+            </a:effectRef>
+            <a:fontRef idx="minor">
+              <a:schemeClr val="lt1"/>
+            </a:fontRef>
+          </p:style>
+          <p:txBody>
+            <a:bodyPr rtlCol="0" anchor="ctr"/>
+            <a:lstStyle/>
+            <a:p>
+              <a:r>
+                <a:rPr lang="en-US" sz="1600" b="1" dirty="0" smtClean="0">
+                  <a:effectLst>
+                    <a:outerShdw blurRad="38100" dist="38100" dir="2700000" algn="tl">
+                      <a:srgbClr val="000000">
+                        <a:alpha val="43137"/>
+                      </a:srgbClr>
+                    </a:outerShdw>
+                  </a:effectLst>
+                  <a:latin typeface="Corbel" panose="020B0503020204020204" pitchFamily="34" charset="0"/>
+                </a:rPr>
+                <a:t>      Technology</a:t>
+              </a:r>
+              <a:endParaRPr lang="en-US" sz="1600" b="1" dirty="0">
+                <a:effectLst>
+                  <a:outerShdw blurRad="38100" dist="38100" dir="2700000" algn="tl">
+                    <a:srgbClr val="000000">
+                      <a:alpha val="43137"/>
+                    </a:srgbClr>
+                  </a:outerShdw>
+                </a:effectLst>
+                <a:latin typeface="Corbel" panose="020B0503020204020204" pitchFamily="34" charset="0"/>
+              </a:endParaRPr>
+            </a:p>
+          </p:txBody>
+        </p:sp>
+        <p:pic>
+          <p:nvPicPr>
+            <p:cNvPr id="25" name="Picture 24"/>
+            <p:cNvPicPr>
+              <a:picLocks noChangeAspect="1"/>
+            </p:cNvPicPr>
+            <p:nvPr/>
+          </p:nvPicPr>
+          <p:blipFill>
+            <a:blip r:embed="rId13" cstate="print">
+              <a:extLst>
+                <a:ext uri="{28A0092B-C50C-407E-A947-70E740481C1C}">
+                  <a14:useLocalDpi xmlns:a14="http://schemas.microsoft.com/office/drawing/2010/main" val="0"/>
+                </a:ext>
+              </a:extLst>
+            </a:blip>
+            <a:stretch>
+              <a:fillRect/>
+            </a:stretch>
+          </p:blipFill>
+          <p:spPr>
+            <a:xfrm>
+              <a:off x="7010400" y="2362200"/>
+              <a:ext cx="1371600" cy="801529"/>
+            </a:xfrm>
+            <a:prstGeom prst="rect">
+              <a:avLst/>
+            </a:prstGeom>
+          </p:spPr>
+        </p:pic>
+        <p:sp>
+          <p:nvSpPr>
+            <p:cNvPr id="41" name="Rectangle 40"/>
+            <p:cNvSpPr/>
+            <p:nvPr/>
+          </p:nvSpPr>
+          <p:spPr>
+            <a:xfrm rot="19847357">
+              <a:off x="690143" y="2284593"/>
+              <a:ext cx="3169299" cy="956741"/>
+            </a:xfrm>
+            <a:prstGeom prst="rect">
+              <a:avLst/>
+            </a:prstGeom>
+            <a:solidFill>
+              <a:schemeClr val="bg1"/>
+            </a:solidFill>
+            <a:ln w="44450">
+              <a:solidFill>
+                <a:schemeClr val="accent2">
+                  <a:shade val="95000"/>
+                  <a:satMod val="105000"/>
+                </a:schemeClr>
+              </a:solidFill>
+            </a:ln>
+            <a:effectLst>
+              <a:outerShdw blurRad="40000" dist="23000" dir="5400000" rotWithShape="0">
+                <a:srgbClr val="000000">
+                  <a:alpha val="35000"/>
+                </a:srgbClr>
+              </a:outerShdw>
+            </a:effectLst>
+          </p:spPr>
+          <p:style>
+            <a:lnRef idx="1">
+              <a:schemeClr val="accent2"/>
+            </a:lnRef>
+            <a:fillRef idx="3">
+              <a:schemeClr val="accent2"/>
+            </a:fillRef>
+            <a:effectRef idx="2">
+              <a:schemeClr val="accent2"/>
+            </a:effectRef>
+            <a:fontRef idx="minor">
+              <a:schemeClr val="lt1"/>
+            </a:fontRef>
+          </p:style>
+          <p:txBody>
+            <a:bodyPr rot="0" spcFirstLastPara="0" vertOverflow="overflow" horzOverflow="overflow" vert="horz" wrap="square" lIns="91440" tIns="45720" rIns="91440" bIns="45720" numCol="1" spcCol="0" rtlCol="0" fromWordArt="0" anchor="ctr" anchorCtr="0" forceAA="0" compatLnSpc="1">
+              <a:prstTxWarp prst="textNoShape">
+                <a:avLst/>
+              </a:prstTxWarp>
+              <a:noAutofit/>
+            </a:bodyPr>
+            <a:lstStyle/>
+            <a:p>
+              <a:pPr algn="ctr"/>
+              <a:r>
+                <a:rPr lang="en-US" sz="4000" b="1" dirty="0" smtClean="0">
+                  <a:solidFill>
+                    <a:srgbClr val="C00000"/>
+                  </a:solidFill>
+                  <a:effectLst>
+                    <a:outerShdw blurRad="38100" dist="38100" dir="2700000" algn="tl">
+                      <a:srgbClr val="000000">
+                        <a:alpha val="43137"/>
+                      </a:srgbClr>
+                    </a:outerShdw>
+                  </a:effectLst>
+                  <a:latin typeface="Corbel" panose="020B0503020204020204" pitchFamily="34" charset="0"/>
+                </a:rPr>
+                <a:t>VOID</a:t>
+              </a:r>
+            </a:p>
+          </p:txBody>
+        </p:sp>
+      </p:grpSp>
+    </p:spTree>
+    <p:extLst>
+      <p:ext uri="{BB962C8B-B14F-4D97-AF65-F5344CB8AC3E}">
+        <p14:creationId xmlns:p14="http://schemas.microsoft.com/office/powerpoint/2010/main" val="680526488"/>
+      </p:ext>
+    </p:extLst>
+  </p:cSld>
+  <p:clrMapOvr>
+    <a:masterClrMapping/>
+  </p:clrMapOvr>
+</p:sld>
+</file>
+
+<file path=ppt/slides/slide6.xml><?xml version="1.0" encoding="utf-8"?>
+<p:sld xmlns:a="http://schemas.openxmlformats.org/drawingml/2006/main" xmlns:r="http://schemas.openxmlformats.org/officeDocument/2006/relationships" xmlns:p="http://schemas.openxmlformats.org/presentationml/2006/main">
+  <p:cSld>
+    <p:spTree>
+      <p:nvGrpSpPr>
+        <p:cNvPr id="1" name=""/>
+        <p:cNvGrpSpPr/>
+        <p:nvPr/>
+      </p:nvGrpSpPr>
+      <p:grpSpPr>
+        <a:xfrm>
+          <a:off x="0" y="0"/>
+          <a:ext cx="0" cy="0"/>
+          <a:chOff x="0" y="0"/>
+          <a:chExt cx="0" cy="0"/>
+        </a:xfrm>
+      </p:grpSpPr>
+      <p:sp>
+        <p:nvSpPr>
+          <p:cNvPr id="2" name="Rectangle 1"/>
+          <p:cNvSpPr/>
+          <p:nvPr/>
+        </p:nvSpPr>
+        <p:spPr>
+          <a:xfrm>
+            <a:off x="0" y="304800"/>
+            <a:ext cx="9144000" cy="457200"/>
+          </a:xfrm>
+          <a:prstGeom prst="rect">
+            <a:avLst/>
+          </a:prstGeom>
+        </p:spPr>
+        <p:style>
+          <a:lnRef idx="1">
+            <a:schemeClr val="accent3"/>
+          </a:lnRef>
+          <a:fillRef idx="3">
+            <a:schemeClr val="accent3"/>
+          </a:fillRef>
+          <a:effectRef idx="2">
+            <a:schemeClr val="accent3"/>
+          </a:effectRef>
+          <a:fontRef idx="minor">
+            <a:schemeClr val="lt1"/>
+          </a:fontRef>
+        </p:style>
+        <p:txBody>
+          <a:bodyPr rtlCol="0" anchor="ctr"/>
+          <a:lstStyle/>
+          <a:p>
+            <a:r>
+              <a:rPr lang="en-US" dirty="0" smtClean="0">
+                <a:effectLst>
+                  <a:outerShdw blurRad="38100" dist="38100" dir="2700000" algn="tl">
+                    <a:srgbClr val="000000">
+                      <a:alpha val="43137"/>
+                    </a:srgbClr>
+                  </a:outerShdw>
+                </a:effectLst>
+                <a:latin typeface="Tempus Sans ITC" panose="04020404030D07020202" pitchFamily="82" charset="0"/>
               </a:rPr>
-              <a:t>3D PRINTING BECOMES EASY</a:t>
+              <a:t>WHAT WE DO</a:t>
             </a:r>
             <a:endParaRPr lang="en-US" dirty="0">
-              <a:latin typeface="Corbel" panose="020B0503020204020204" pitchFamily="34" charset="0"/>
+              <a:effectLst>
+                <a:outerShdw blurRad="38100" dist="38100" dir="2700000" algn="tl">
+                  <a:srgbClr val="000000">
+                    <a:alpha val="43137"/>
+                  </a:srgbClr>
+                </a:outerShdw>
+              </a:effectLst>
+              <a:latin typeface="Tempus Sans ITC" panose="04020404030D07020202" pitchFamily="82" charset="0"/>
             </a:endParaRPr>
           </a:p>
         </p:txBody>
       </p:sp>
     </p:spTree>
+    <p:extLst>
+      <p:ext uri="{BB962C8B-B14F-4D97-AF65-F5344CB8AC3E}">
+        <p14:creationId xmlns:p14="http://schemas.microsoft.com/office/powerpoint/2010/main" val="532738431"/>
+      </p:ext>
+    </p:extLst>
   </p:cSld>
   <p:clrMapOvr>
     <a:masterClrMapping/>
@@ -5657,6 +7714,31 @@
     </a:fmtScheme>
   </a:themeElements>
   <a:objectDefaults>
+    <a:spDef>
+      <a:spPr>
+        <a:ln/>
+      </a:spPr>
+      <a:bodyPr rtlCol="0" anchor="ctr"/>
+      <a:lstStyle>
+        <a:defPPr algn="ctr">
+          <a:defRPr sz="1400" dirty="0" smtClean="0"/>
+        </a:defPPr>
+      </a:lstStyle>
+      <a:style>
+        <a:lnRef idx="1">
+          <a:schemeClr val="accent2"/>
+        </a:lnRef>
+        <a:fillRef idx="3">
+          <a:schemeClr val="accent2"/>
+        </a:fillRef>
+        <a:effectRef idx="2">
+          <a:schemeClr val="accent2"/>
+        </a:effectRef>
+        <a:fontRef idx="minor">
+          <a:schemeClr val="lt1"/>
+        </a:fontRef>
+      </a:style>
+    </a:spDef>
     <a:lnDef>
       <a:spPr>
         <a:ln>
@@ -5682,9 +7764,10 @@
       </a:style>
     </a:lnDef>
   </a:objectDefaults>
+  <a:extraClrSchemeLst/>
   <a:extLst>
     <a:ext uri="{05A4C25C-085E-4340-85A3-A5531E510DB2}">
-      <thm15:themeFamily xmlns:thm15="http://schemas.microsoft.com/office/thememl/2012/main" name="Office Theme" id="{62F939B6-93AF-4DB8-9C6B-D6C7DFDC589F}" vid="{4A3C46E8-61CC-4603-A589-7422A47A8E4A}"/>
+      <thm15:themeFamily xmlns:thm15="http://schemas.microsoft.com/office/thememl/2012/main" xmlns="" name="Office Theme" id="{62F939B6-93AF-4DB8-9C6B-D6C7DFDC589F}" vid="{4A3C46E8-61CC-4603-A589-7422A47A8E4A}"/>
     </a:ext>
   </a:extLst>
 </a:theme>

</xml_diff>